<commit_message>
Refactor presentation report generation to support multiple report types and enhance error handling
</commit_message>
<xml_diff>
--- a/files/base/InvestigacionMercados.pptx
+++ b/files/base/InvestigacionMercados.pptx
@@ -9,7 +9,7 @@
   </p:notesMasterIdLst>
   <p:sldIdLst>
     <p:sldId id="586" r:id="rId5"/>
-    <p:sldId id="1502" r:id="rId6"/>
+    <p:sldId id="1524" r:id="rId6"/>
     <p:sldId id="1485" r:id="rId7"/>
     <p:sldId id="1487" r:id="rId8"/>
     <p:sldId id="1507" r:id="rId9"/>
@@ -136,7 +136,7 @@
 <file path=ppt/charts/chart1.xml><?xml version="1.0" encoding="utf-8"?>
 <c:chartSpace xmlns:c="http://schemas.openxmlformats.org/drawingml/2006/chart" xmlns:a="http://schemas.openxmlformats.org/drawingml/2006/main" xmlns:r="http://schemas.openxmlformats.org/officeDocument/2006/relationships" xmlns:c16r2="http://schemas.microsoft.com/office/drawing/2015/06/chart">
   <c:date1904 val="0"/>
-  <c:lang val="en-US"/>
+  <c:lang val="es-ES"/>
   <c:roundedCorners val="0"/>
   <mc:AlternateContent xmlns:mc="http://schemas.openxmlformats.org/markup-compatibility/2006">
     <mc:Choice xmlns:c14="http://schemas.microsoft.com/office/drawing/2007/8/2/chart" Requires="c14">
@@ -493,7 +493,7 @@
 <file path=ppt/charts/chart2.xml><?xml version="1.0" encoding="utf-8"?>
 <c:chartSpace xmlns:c="http://schemas.openxmlformats.org/drawingml/2006/chart" xmlns:a="http://schemas.openxmlformats.org/drawingml/2006/main" xmlns:r="http://schemas.openxmlformats.org/officeDocument/2006/relationships" xmlns:c16r2="http://schemas.microsoft.com/office/drawing/2015/06/chart">
   <c:date1904 val="0"/>
-  <c:lang val="en-US"/>
+  <c:lang val="es-ES"/>
   <c:roundedCorners val="0"/>
   <mc:AlternateContent xmlns:mc="http://schemas.openxmlformats.org/markup-compatibility/2006">
     <mc:Choice xmlns:c14="http://schemas.microsoft.com/office/drawing/2007/8/2/chart" Requires="c14">
@@ -1864,7 +1864,7 @@
           <a:p>
             <a:fld id="{C18CF82C-12A9-4AE1-A40D-061B14899D6E}" type="datetimeFigureOut">
               <a:rPr lang="es-EC" smtClean="0"/>
-              <a:t>6/10/2025</a:t>
+              <a:t>14/10/2025</a:t>
             </a:fld>
             <a:endParaRPr lang="es-EC"/>
           </a:p>
@@ -2023,7 +2023,7 @@
           <a:p>
             <a:fld id="{9A988B66-497C-4D8B-9A2F-76C649258DAF}" type="slidenum">
               <a:rPr lang="es-EC" smtClean="0"/>
-              <a:t>‹#›</a:t>
+              <a:t>‹Nº›</a:t>
             </a:fld>
             <a:endParaRPr lang="es-EC"/>
           </a:p>
@@ -2140,7 +2140,7 @@
         <p:cNvPr id="1" name="">
           <a:extLst>
             <a:ext uri="{FF2B5EF4-FFF2-40B4-BE49-F238E27FC236}">
-              <a16:creationId xmlns:a16="http://schemas.microsoft.com/office/drawing/2014/main" id="{9F3BF825-F219-8921-EF89-F3E574EF6B48}"/>
+              <a16:creationId xmlns:a16="http://schemas.microsoft.com/office/drawing/2014/main" id="{D0C980AC-15AF-41EC-45B9-5B0B8E9F9F82}"/>
             </a:ext>
           </a:extLst>
         </p:cNvPr>
@@ -2160,7 +2160,7 @@
           <p:cNvPr id="2" name="Marcador de imagen de diapositiva 1">
             <a:extLst>
               <a:ext uri="{FF2B5EF4-FFF2-40B4-BE49-F238E27FC236}">
-                <a16:creationId xmlns:a16="http://schemas.microsoft.com/office/drawing/2014/main" id="{2FD52C0D-29AD-42C6-BF9C-764E8E980056}"/>
+                <a16:creationId xmlns:a16="http://schemas.microsoft.com/office/drawing/2014/main" id="{410908D3-9A9E-4B0A-F6B6-D0BA028CC0A4}"/>
               </a:ext>
             </a:extLst>
           </p:cNvPr>
@@ -2178,7 +2178,7 @@
           <p:cNvPr id="3" name="Marcador de notas 2">
             <a:extLst>
               <a:ext uri="{FF2B5EF4-FFF2-40B4-BE49-F238E27FC236}">
-                <a16:creationId xmlns:a16="http://schemas.microsoft.com/office/drawing/2014/main" id="{F3F0A984-9053-30B8-EC18-954E228ECC03}"/>
+                <a16:creationId xmlns:a16="http://schemas.microsoft.com/office/drawing/2014/main" id="{7D3155C1-B7B5-00AB-E72E-9F889496946F}"/>
               </a:ext>
             </a:extLst>
           </p:cNvPr>
@@ -2203,7 +2203,7 @@
           <p:cNvPr id="4" name="Marcador de número de diapositiva 3">
             <a:extLst>
               <a:ext uri="{FF2B5EF4-FFF2-40B4-BE49-F238E27FC236}">
-                <a16:creationId xmlns:a16="http://schemas.microsoft.com/office/drawing/2014/main" id="{2EC2D623-D722-5449-1310-24295CBC6AA4}"/>
+                <a16:creationId xmlns:a16="http://schemas.microsoft.com/office/drawing/2014/main" id="{C965CEAC-9EE1-C6BA-DF3B-20E7C30A0DC8}"/>
               </a:ext>
             </a:extLst>
           </p:cNvPr>
@@ -2230,7 +2230,7 @@
     </p:spTree>
     <p:extLst>
       <p:ext uri="{BB962C8B-B14F-4D97-AF65-F5344CB8AC3E}">
-        <p14:creationId xmlns:p14="http://schemas.microsoft.com/office/powerpoint/2010/main" val="666165700"/>
+        <p14:creationId xmlns:p14="http://schemas.microsoft.com/office/powerpoint/2010/main" val="2508496724"/>
       </p:ext>
     </p:extLst>
   </p:cSld>
@@ -3208,7 +3208,7 @@
           <a:p>
             <a:fld id="{6C81E8AB-F8E6-46EF-9A6B-58A04613E467}" type="datetimeFigureOut">
               <a:rPr lang="es-EC" smtClean="0"/>
-              <a:t>6/10/2025</a:t>
+              <a:t>14/10/2025</a:t>
             </a:fld>
             <a:endParaRPr lang="es-EC"/>
           </a:p>
@@ -3262,7 +3262,7 @@
           <a:p>
             <a:fld id="{6D102F96-5C4A-4C97-AA25-2264A4AFC9D6}" type="slidenum">
               <a:rPr lang="es-EC" smtClean="0"/>
-              <a:t>‹#›</a:t>
+              <a:t>‹Nº›</a:t>
             </a:fld>
             <a:endParaRPr lang="es-EC"/>
           </a:p>
@@ -3408,7 +3408,7 @@
           <a:p>
             <a:fld id="{6C81E8AB-F8E6-46EF-9A6B-58A04613E467}" type="datetimeFigureOut">
               <a:rPr lang="es-EC" smtClean="0"/>
-              <a:t>6/10/2025</a:t>
+              <a:t>14/10/2025</a:t>
             </a:fld>
             <a:endParaRPr lang="es-EC"/>
           </a:p>
@@ -3462,7 +3462,7 @@
           <a:p>
             <a:fld id="{6D102F96-5C4A-4C97-AA25-2264A4AFC9D6}" type="slidenum">
               <a:rPr lang="es-EC" smtClean="0"/>
-              <a:t>‹#›</a:t>
+              <a:t>‹Nº›</a:t>
             </a:fld>
             <a:endParaRPr lang="es-EC"/>
           </a:p>
@@ -3618,7 +3618,7 @@
           <a:p>
             <a:fld id="{6C81E8AB-F8E6-46EF-9A6B-58A04613E467}" type="datetimeFigureOut">
               <a:rPr lang="es-EC" smtClean="0"/>
-              <a:t>6/10/2025</a:t>
+              <a:t>14/10/2025</a:t>
             </a:fld>
             <a:endParaRPr lang="es-EC"/>
           </a:p>
@@ -3672,7 +3672,7 @@
           <a:p>
             <a:fld id="{6D102F96-5C4A-4C97-AA25-2264A4AFC9D6}" type="slidenum">
               <a:rPr lang="es-EC" smtClean="0"/>
-              <a:t>‹#›</a:t>
+              <a:t>‹Nº›</a:t>
             </a:fld>
             <a:endParaRPr lang="es-EC"/>
           </a:p>
@@ -3919,7 +3919,7 @@
           <a:p>
             <a:fld id="{6C81E8AB-F8E6-46EF-9A6B-58A04613E467}" type="datetimeFigureOut">
               <a:rPr lang="es-EC" smtClean="0"/>
-              <a:t>6/10/2025</a:t>
+              <a:t>14/10/2025</a:t>
             </a:fld>
             <a:endParaRPr lang="es-EC"/>
           </a:p>
@@ -3973,7 +3973,7 @@
           <a:p>
             <a:fld id="{6D102F96-5C4A-4C97-AA25-2264A4AFC9D6}" type="slidenum">
               <a:rPr lang="es-EC" smtClean="0"/>
-              <a:t>‹#›</a:t>
+              <a:t>‹Nº›</a:t>
             </a:fld>
             <a:endParaRPr lang="es-EC"/>
           </a:p>
@@ -4195,7 +4195,7 @@
           <a:p>
             <a:fld id="{6C81E8AB-F8E6-46EF-9A6B-58A04613E467}" type="datetimeFigureOut">
               <a:rPr lang="es-EC" smtClean="0"/>
-              <a:t>6/10/2025</a:t>
+              <a:t>14/10/2025</a:t>
             </a:fld>
             <a:endParaRPr lang="es-EC"/>
           </a:p>
@@ -4249,7 +4249,7 @@
           <a:p>
             <a:fld id="{6D102F96-5C4A-4C97-AA25-2264A4AFC9D6}" type="slidenum">
               <a:rPr lang="es-EC" smtClean="0"/>
-              <a:t>‹#›</a:t>
+              <a:t>‹Nº›</a:t>
             </a:fld>
             <a:endParaRPr lang="es-EC"/>
           </a:p>
@@ -4463,7 +4463,7 @@
           <a:p>
             <a:fld id="{6C81E8AB-F8E6-46EF-9A6B-58A04613E467}" type="datetimeFigureOut">
               <a:rPr lang="es-EC" smtClean="0"/>
-              <a:t>6/10/2025</a:t>
+              <a:t>14/10/2025</a:t>
             </a:fld>
             <a:endParaRPr lang="es-EC"/>
           </a:p>
@@ -4517,7 +4517,7 @@
           <a:p>
             <a:fld id="{6D102F96-5C4A-4C97-AA25-2264A4AFC9D6}" type="slidenum">
               <a:rPr lang="es-EC" smtClean="0"/>
-              <a:t>‹#›</a:t>
+              <a:t>‹Nº›</a:t>
             </a:fld>
             <a:endParaRPr lang="es-EC"/>
           </a:p>
@@ -4878,7 +4878,7 @@
           <a:p>
             <a:fld id="{6C81E8AB-F8E6-46EF-9A6B-58A04613E467}" type="datetimeFigureOut">
               <a:rPr lang="es-EC" smtClean="0"/>
-              <a:t>6/10/2025</a:t>
+              <a:t>14/10/2025</a:t>
             </a:fld>
             <a:endParaRPr lang="es-EC"/>
           </a:p>
@@ -4932,7 +4932,7 @@
           <a:p>
             <a:fld id="{6D102F96-5C4A-4C97-AA25-2264A4AFC9D6}" type="slidenum">
               <a:rPr lang="es-EC" smtClean="0"/>
-              <a:t>‹#›</a:t>
+              <a:t>‹Nº›</a:t>
             </a:fld>
             <a:endParaRPr lang="es-EC"/>
           </a:p>
@@ -5020,7 +5020,7 @@
           <a:p>
             <a:fld id="{6C81E8AB-F8E6-46EF-9A6B-58A04613E467}" type="datetimeFigureOut">
               <a:rPr lang="es-EC" smtClean="0"/>
-              <a:t>6/10/2025</a:t>
+              <a:t>14/10/2025</a:t>
             </a:fld>
             <a:endParaRPr lang="es-EC"/>
           </a:p>
@@ -5074,7 +5074,7 @@
           <a:p>
             <a:fld id="{6D102F96-5C4A-4C97-AA25-2264A4AFC9D6}" type="slidenum">
               <a:rPr lang="es-EC" smtClean="0"/>
-              <a:t>‹#›</a:t>
+              <a:t>‹Nº›</a:t>
             </a:fld>
             <a:endParaRPr lang="es-EC"/>
           </a:p>
@@ -5133,7 +5133,7 @@
           <a:p>
             <a:fld id="{6C81E8AB-F8E6-46EF-9A6B-58A04613E467}" type="datetimeFigureOut">
               <a:rPr lang="es-EC" smtClean="0"/>
-              <a:t>6/10/2025</a:t>
+              <a:t>14/10/2025</a:t>
             </a:fld>
             <a:endParaRPr lang="es-EC"/>
           </a:p>
@@ -5187,7 +5187,7 @@
           <a:p>
             <a:fld id="{6D102F96-5C4A-4C97-AA25-2264A4AFC9D6}" type="slidenum">
               <a:rPr lang="es-EC" smtClean="0"/>
-              <a:t>‹#›</a:t>
+              <a:t>‹Nº›</a:t>
             </a:fld>
             <a:endParaRPr lang="es-EC"/>
           </a:p>
@@ -5446,7 +5446,7 @@
           <a:p>
             <a:fld id="{6C81E8AB-F8E6-46EF-9A6B-58A04613E467}" type="datetimeFigureOut">
               <a:rPr lang="es-EC" smtClean="0"/>
-              <a:t>6/10/2025</a:t>
+              <a:t>14/10/2025</a:t>
             </a:fld>
             <a:endParaRPr lang="es-EC"/>
           </a:p>
@@ -5500,7 +5500,7 @@
           <a:p>
             <a:fld id="{6D102F96-5C4A-4C97-AA25-2264A4AFC9D6}" type="slidenum">
               <a:rPr lang="es-EC" smtClean="0"/>
-              <a:t>‹#›</a:t>
+              <a:t>‹Nº›</a:t>
             </a:fld>
             <a:endParaRPr lang="es-EC"/>
           </a:p>
@@ -5735,7 +5735,7 @@
           <a:p>
             <a:fld id="{6C81E8AB-F8E6-46EF-9A6B-58A04613E467}" type="datetimeFigureOut">
               <a:rPr lang="es-EC" smtClean="0"/>
-              <a:t>6/10/2025</a:t>
+              <a:t>14/10/2025</a:t>
             </a:fld>
             <a:endParaRPr lang="es-EC"/>
           </a:p>
@@ -5789,7 +5789,7 @@
           <a:p>
             <a:fld id="{6D102F96-5C4A-4C97-AA25-2264A4AFC9D6}" type="slidenum">
               <a:rPr lang="es-EC" smtClean="0"/>
-              <a:t>‹#›</a:t>
+              <a:t>‹Nº›</a:t>
             </a:fld>
             <a:endParaRPr lang="es-EC"/>
           </a:p>
@@ -5978,7 +5978,7 @@
           <a:p>
             <a:fld id="{6C81E8AB-F8E6-46EF-9A6B-58A04613E467}" type="datetimeFigureOut">
               <a:rPr lang="es-EC" smtClean="0"/>
-              <a:t>6/10/2025</a:t>
+              <a:t>14/10/2025</a:t>
             </a:fld>
             <a:endParaRPr lang="es-EC"/>
           </a:p>
@@ -6068,7 +6068,7 @@
           <a:p>
             <a:fld id="{6D102F96-5C4A-4C97-AA25-2264A4AFC9D6}" type="slidenum">
               <a:rPr lang="es-EC" smtClean="0"/>
-              <a:t>‹#›</a:t>
+              <a:t>‹Nº›</a:t>
             </a:fld>
             <a:endParaRPr lang="es-EC"/>
           </a:p>
@@ -11454,7 +11454,7 @@
         <p:cNvPr id="1" name="">
           <a:extLst>
             <a:ext uri="{FF2B5EF4-FFF2-40B4-BE49-F238E27FC236}">
-              <a16:creationId xmlns:a16="http://schemas.microsoft.com/office/drawing/2014/main" id="{8E92CC55-C78C-657B-EF41-16C560E6568D}"/>
+              <a16:creationId xmlns:a16="http://schemas.microsoft.com/office/drawing/2014/main" id="{6BF67EAE-BDBB-7773-604F-DB5F481957AA}"/>
             </a:ext>
           </a:extLst>
         </p:cNvPr>
@@ -11474,7 +11474,7 @@
           <p:cNvPr id="2" name="Content Placeholder 2">
             <a:extLst>
               <a:ext uri="{FF2B5EF4-FFF2-40B4-BE49-F238E27FC236}">
-                <a16:creationId xmlns:a16="http://schemas.microsoft.com/office/drawing/2014/main" id="{EC8448AF-0D03-18FC-750D-1EEA4485725E}"/>
+                <a16:creationId xmlns:a16="http://schemas.microsoft.com/office/drawing/2014/main" id="{EC50474E-BF6C-8D3B-F4ED-BBA03709E7A8}"/>
               </a:ext>
             </a:extLst>
           </p:cNvPr>
@@ -11485,8 +11485,8 @@
         </p:nvSpPr>
         <p:spPr>
           <a:xfrm>
-            <a:off x="755137" y="431914"/>
-            <a:ext cx="8698708" cy="699558"/>
+            <a:off x="566146" y="424270"/>
+            <a:ext cx="1735196" cy="409411"/>
           </a:xfrm>
           <a:prstGeom prst="rect">
             <a:avLst/>
@@ -11665,7 +11665,7 @@
               <a:buNone/>
             </a:pPr>
             <a:r>
-              <a:rPr lang="es-MX" sz="3200" b="1">
+              <a:rPr lang="es-MX" sz="2000" b="1">
                 <a:solidFill>
                   <a:srgbClr val="A5133D"/>
                 </a:solidFill>
@@ -11676,55 +11676,12 @@
           </a:p>
         </p:txBody>
       </p:sp>
-      <p:cxnSp>
-        <p:nvCxnSpPr>
-          <p:cNvPr id="4" name="Conector recto 3">
-            <a:extLst>
-              <a:ext uri="{FF2B5EF4-FFF2-40B4-BE49-F238E27FC236}">
-                <a16:creationId xmlns:a16="http://schemas.microsoft.com/office/drawing/2014/main" id="{1E460D69-1A41-3466-4D75-313BA1C6C079}"/>
-              </a:ext>
-            </a:extLst>
-          </p:cNvPr>
-          <p:cNvCxnSpPr>
-            <a:cxnSpLocks/>
-          </p:cNvCxnSpPr>
-          <p:nvPr/>
-        </p:nvCxnSpPr>
-        <p:spPr>
-          <a:xfrm>
-            <a:off x="575703" y="406380"/>
-            <a:ext cx="0" cy="709726"/>
-          </a:xfrm>
-          <a:prstGeom prst="line">
-            <a:avLst/>
-          </a:prstGeom>
-          <a:ln w="57150">
-            <a:solidFill>
-              <a:schemeClr val="tx1"/>
-            </a:solidFill>
-          </a:ln>
-        </p:spPr>
-        <p:style>
-          <a:lnRef idx="1">
-            <a:schemeClr val="accent1"/>
-          </a:lnRef>
-          <a:fillRef idx="0">
-            <a:schemeClr val="accent1"/>
-          </a:fillRef>
-          <a:effectRef idx="0">
-            <a:schemeClr val="accent1"/>
-          </a:effectRef>
-          <a:fontRef idx="minor">
-            <a:schemeClr val="tx1"/>
-          </a:fontRef>
-        </p:style>
-      </p:cxnSp>
       <p:sp>
         <p:nvSpPr>
           <p:cNvPr id="9" name="CuadroTexto 8">
             <a:extLst>
               <a:ext uri="{FF2B5EF4-FFF2-40B4-BE49-F238E27FC236}">
-                <a16:creationId xmlns:a16="http://schemas.microsoft.com/office/drawing/2014/main" id="{BFAE98E2-9649-FC77-87E1-0DD96F97DA95}"/>
+                <a16:creationId xmlns:a16="http://schemas.microsoft.com/office/drawing/2014/main" id="{4BF0FA6C-D542-6E3B-0EDF-87056EB6A279}"/>
               </a:ext>
             </a:extLst>
           </p:cNvPr>
@@ -11733,8 +11690,8 @@
         </p:nvSpPr>
         <p:spPr>
           <a:xfrm>
-            <a:off x="7857942" y="3397277"/>
-            <a:ext cx="3301055" cy="340519"/>
+            <a:off x="7857941" y="3326717"/>
+            <a:ext cx="3301055" cy="578882"/>
           </a:xfrm>
           <a:prstGeom prst="roundRect">
             <a:avLst/>
@@ -11756,11 +11713,14 @@
               <a:rPr lang="es-MX" sz="1400" b="1">
                 <a:latin typeface="Century Gothic" panose="020B0502020202020204" pitchFamily="34" charset="0"/>
               </a:rPr>
-              <a:t>Nombre del proponente:</a:t>
+              <a:t>Nombre del proponente: </a:t>
             </a:r>
-            <a:endParaRPr lang="es-MX" sz="1400">
-              <a:latin typeface="Century Gothic" panose="020B0502020202020204" pitchFamily="34" charset="0"/>
-            </a:endParaRPr>
+            <a:r>
+              <a:rPr lang="es-MX" sz="1400">
+                <a:latin typeface="Century Gothic" panose="020B0502020202020204" pitchFamily="34" charset="0"/>
+              </a:rPr>
+              <a:t>Fulanito Lopez</a:t>
+            </a:r>
           </a:p>
         </p:txBody>
       </p:sp>
@@ -11769,7 +11729,7 @@
           <p:cNvPr id="3" name="CuadroTexto 2">
             <a:extLst>
               <a:ext uri="{FF2B5EF4-FFF2-40B4-BE49-F238E27FC236}">
-                <a16:creationId xmlns:a16="http://schemas.microsoft.com/office/drawing/2014/main" id="{A995CB48-220F-11C3-620C-76DFC4556804}"/>
+                <a16:creationId xmlns:a16="http://schemas.microsoft.com/office/drawing/2014/main" id="{4BE6EDAC-8DF1-9756-F857-50B04DB4D8D4}"/>
               </a:ext>
             </a:extLst>
           </p:cNvPr>
@@ -11812,7 +11772,7 @@
           <p:cNvPr id="10" name="CuadroTexto 9">
             <a:extLst>
               <a:ext uri="{FF2B5EF4-FFF2-40B4-BE49-F238E27FC236}">
-                <a16:creationId xmlns:a16="http://schemas.microsoft.com/office/drawing/2014/main" id="{30CDD1F0-DB0C-A5B6-7E74-CF0AB1DAA2D3}"/>
+                <a16:creationId xmlns:a16="http://schemas.microsoft.com/office/drawing/2014/main" id="{AE819DC9-113A-AFD1-9DB2-746805714B29}"/>
               </a:ext>
             </a:extLst>
           </p:cNvPr>
@@ -11821,7 +11781,7 @@
         </p:nvSpPr>
         <p:spPr>
           <a:xfrm>
-            <a:off x="2091361" y="4440523"/>
+            <a:off x="2120115" y="4720605"/>
             <a:ext cx="3344013" cy="340519"/>
           </a:xfrm>
           <a:prstGeom prst="roundRect">
@@ -11844,11 +11804,14 @@
               <a:rPr lang="es-MX" sz="1400" b="1">
                 <a:latin typeface="Century Gothic" panose="020B0502020202020204" pitchFamily="34" charset="0"/>
               </a:rPr>
-              <a:t>Duración:</a:t>
+              <a:t>Duración: </a:t>
             </a:r>
-            <a:endParaRPr lang="es-MX" sz="1400">
-              <a:latin typeface="Century Gothic" panose="020B0502020202020204" pitchFamily="34" charset="0"/>
-            </a:endParaRPr>
+            <a:r>
+              <a:rPr lang="es-MX" sz="1400">
+                <a:latin typeface="Century Gothic" panose="020B0502020202020204" pitchFamily="34" charset="0"/>
+              </a:rPr>
+              <a:t>X semestres</a:t>
+            </a:r>
           </a:p>
         </p:txBody>
       </p:sp>
@@ -11857,7 +11820,7 @@
           <p:cNvPr id="11" name="CuadroTexto 10">
             <a:extLst>
               <a:ext uri="{FF2B5EF4-FFF2-40B4-BE49-F238E27FC236}">
-                <a16:creationId xmlns:a16="http://schemas.microsoft.com/office/drawing/2014/main" id="{3BCBB6DE-8FCC-56FF-4608-F577A1859F57}"/>
+                <a16:creationId xmlns:a16="http://schemas.microsoft.com/office/drawing/2014/main" id="{663D2086-1745-962F-7413-C50D600E99CA}"/>
               </a:ext>
             </a:extLst>
           </p:cNvPr>
@@ -11866,52 +11829,7 @@
         </p:nvSpPr>
         <p:spPr>
           <a:xfrm>
-            <a:off x="2160293" y="5710089"/>
-            <a:ext cx="3301055" cy="340519"/>
-          </a:xfrm>
-          <a:prstGeom prst="roundRect">
-            <a:avLst/>
-          </a:prstGeom>
-          <a:solidFill>
-            <a:schemeClr val="bg1">
-              <a:lumMod val="95000"/>
-            </a:schemeClr>
-          </a:solidFill>
-        </p:spPr>
-        <p:txBody>
-          <a:bodyPr wrap="square">
-            <a:spAutoFit/>
-          </a:bodyPr>
-          <a:lstStyle/>
-          <a:p>
-            <a:pPr algn="just"/>
-            <a:r>
-              <a:rPr lang="es-MX" sz="1400" b="1">
-                <a:latin typeface="Century Gothic" panose="020B0502020202020204" pitchFamily="34" charset="0"/>
-              </a:rPr>
-              <a:t>Modalidad:</a:t>
-            </a:r>
-            <a:endParaRPr lang="es-MX" sz="1400">
-              <a:latin typeface="Century Gothic" panose="020B0502020202020204" pitchFamily="34" charset="0"/>
-            </a:endParaRPr>
-          </a:p>
-        </p:txBody>
-      </p:sp>
-      <p:sp>
-        <p:nvSpPr>
-          <p:cNvPr id="12" name="CuadroTexto 11">
-            <a:extLst>
-              <a:ext uri="{FF2B5EF4-FFF2-40B4-BE49-F238E27FC236}">
-                <a16:creationId xmlns:a16="http://schemas.microsoft.com/office/drawing/2014/main" id="{190B4974-3E22-ED45-B4A4-193F34DA30CB}"/>
-              </a:ext>
-            </a:extLst>
-          </p:cNvPr>
-          <p:cNvSpPr txBox="1"/>
-          <p:nvPr/>
-        </p:nvSpPr>
-        <p:spPr>
-          <a:xfrm>
-            <a:off x="4828637" y="1734034"/>
+            <a:off x="2120114" y="5918239"/>
             <a:ext cx="3344013" cy="340519"/>
           </a:xfrm>
           <a:prstGeom prst="roundRect">
@@ -11934,11 +11852,62 @@
               <a:rPr lang="es-MX" sz="1400" b="1">
                 <a:latin typeface="Century Gothic" panose="020B0502020202020204" pitchFamily="34" charset="0"/>
               </a:rPr>
-              <a:t>Nombre del programa:</a:t>
+              <a:t>Modalidad: </a:t>
             </a:r>
-            <a:endParaRPr lang="es-MX" sz="1400">
-              <a:latin typeface="Century Gothic" panose="020B0502020202020204" pitchFamily="34" charset="0"/>
-            </a:endParaRPr>
+            <a:r>
+              <a:rPr lang="es-MX" sz="1400">
+                <a:latin typeface="Century Gothic" panose="020B0502020202020204" pitchFamily="34" charset="0"/>
+              </a:rPr>
+              <a:t>En línea</a:t>
+            </a:r>
+          </a:p>
+        </p:txBody>
+      </p:sp>
+      <p:sp>
+        <p:nvSpPr>
+          <p:cNvPr id="12" name="CuadroTexto 11">
+            <a:extLst>
+              <a:ext uri="{FF2B5EF4-FFF2-40B4-BE49-F238E27FC236}">
+                <a16:creationId xmlns:a16="http://schemas.microsoft.com/office/drawing/2014/main" id="{E84BF2ED-E2E1-FA84-C39A-D5EB33ECB244}"/>
+              </a:ext>
+            </a:extLst>
+          </p:cNvPr>
+          <p:cNvSpPr txBox="1"/>
+          <p:nvPr/>
+        </p:nvSpPr>
+        <p:spPr>
+          <a:xfrm>
+            <a:off x="3914238" y="2369705"/>
+            <a:ext cx="5898686" cy="340519"/>
+          </a:xfrm>
+          <a:prstGeom prst="roundRect">
+            <a:avLst/>
+          </a:prstGeom>
+          <a:solidFill>
+            <a:schemeClr val="bg1">
+              <a:lumMod val="95000"/>
+            </a:schemeClr>
+          </a:solidFill>
+        </p:spPr>
+        <p:txBody>
+          <a:bodyPr wrap="square">
+            <a:spAutoFit/>
+          </a:bodyPr>
+          <a:lstStyle/>
+          <a:p>
+            <a:pPr algn="just"/>
+            <a:r>
+              <a:rPr lang="es-MX" sz="1400" b="1" dirty="0">
+                <a:latin typeface="Century Gothic" panose="020B0502020202020204" pitchFamily="34" charset="0"/>
+              </a:rPr>
+              <a:t>Nombre del programa: </a:t>
+            </a:r>
+            <a:r>
+              <a:rPr lang="es-MX" sz="1400" dirty="0">
+                <a:latin typeface="Century Gothic" panose="020B0502020202020204" pitchFamily="34" charset="0"/>
+              </a:rPr>
+              <a:t>Maestría en Ciencia de Datos</a:t>
+            </a:r>
           </a:p>
         </p:txBody>
       </p:sp>
@@ -11947,7 +11916,7 @@
           <p:cNvPr id="16" name="Imagen 15">
             <a:extLst>
               <a:ext uri="{FF2B5EF4-FFF2-40B4-BE49-F238E27FC236}">
-                <a16:creationId xmlns:a16="http://schemas.microsoft.com/office/drawing/2014/main" id="{F71B090B-184A-2497-8411-BE436760F0B2}"/>
+                <a16:creationId xmlns:a16="http://schemas.microsoft.com/office/drawing/2014/main" id="{2167CACB-9B05-64C8-BA17-95E8E6D890B4}"/>
               </a:ext>
             </a:extLst>
           </p:cNvPr>
@@ -11964,8 +11933,8 @@
         </p:blipFill>
         <p:spPr>
           <a:xfrm>
-            <a:off x="6677491" y="3109996"/>
-            <a:ext cx="720000" cy="720000"/>
+            <a:off x="7117487" y="3307012"/>
+            <a:ext cx="560007" cy="560007"/>
           </a:xfrm>
           <a:prstGeom prst="rect">
             <a:avLst/>
@@ -11977,7 +11946,7 @@
           <p:cNvPr id="18" name="Imagen 17">
             <a:extLst>
               <a:ext uri="{FF2B5EF4-FFF2-40B4-BE49-F238E27FC236}">
-                <a16:creationId xmlns:a16="http://schemas.microsoft.com/office/drawing/2014/main" id="{B1401E2A-F822-5CF8-B94B-2921F2C51C24}"/>
+                <a16:creationId xmlns:a16="http://schemas.microsoft.com/office/drawing/2014/main" id="{557872CD-2348-DE2F-E0C6-453BE40F1975}"/>
               </a:ext>
             </a:extLst>
           </p:cNvPr>
@@ -11994,8 +11963,8 @@
         </p:blipFill>
         <p:spPr>
           <a:xfrm>
-            <a:off x="729164" y="4250783"/>
-            <a:ext cx="720000" cy="720000"/>
+            <a:off x="1272669" y="4603121"/>
+            <a:ext cx="560007" cy="560007"/>
           </a:xfrm>
           <a:prstGeom prst="rect">
             <a:avLst/>
@@ -12007,7 +11976,7 @@
           <p:cNvPr id="24" name="Imagen 23">
             <a:extLst>
               <a:ext uri="{FF2B5EF4-FFF2-40B4-BE49-F238E27FC236}">
-                <a16:creationId xmlns:a16="http://schemas.microsoft.com/office/drawing/2014/main" id="{C4B7E9A2-442D-A7CF-95BA-A12AC96A8EA6}"/>
+                <a16:creationId xmlns:a16="http://schemas.microsoft.com/office/drawing/2014/main" id="{A564B143-056B-3862-28AC-7C4F19DAF0DB}"/>
               </a:ext>
             </a:extLst>
           </p:cNvPr>
@@ -12024,8 +11993,8 @@
         </p:blipFill>
         <p:spPr>
           <a:xfrm>
-            <a:off x="755137" y="5520349"/>
-            <a:ext cx="720000" cy="720000"/>
+            <a:off x="1272669" y="5757474"/>
+            <a:ext cx="560007" cy="560007"/>
           </a:xfrm>
           <a:prstGeom prst="rect">
             <a:avLst/>
@@ -12037,7 +12006,7 @@
           <p:cNvPr id="6" name="Imagen 5">
             <a:extLst>
               <a:ext uri="{FF2B5EF4-FFF2-40B4-BE49-F238E27FC236}">
-                <a16:creationId xmlns:a16="http://schemas.microsoft.com/office/drawing/2014/main" id="{865D0DED-0709-6651-8F57-A03596E6FC53}"/>
+                <a16:creationId xmlns:a16="http://schemas.microsoft.com/office/drawing/2014/main" id="{E3E3B69B-E955-DFD3-11A6-E7E1B48864ED}"/>
               </a:ext>
             </a:extLst>
           </p:cNvPr>
@@ -12054,7 +12023,7 @@
         </p:blipFill>
         <p:spPr>
           <a:xfrm>
-            <a:off x="3466445" y="1544294"/>
+            <a:off x="3141189" y="2151041"/>
             <a:ext cx="720000" cy="720000"/>
           </a:xfrm>
           <a:prstGeom prst="rect">
@@ -12067,7 +12036,7 @@
           <p:cNvPr id="14" name="CuadroTexto 13">
             <a:extLst>
               <a:ext uri="{FF2B5EF4-FFF2-40B4-BE49-F238E27FC236}">
-                <a16:creationId xmlns:a16="http://schemas.microsoft.com/office/drawing/2014/main" id="{DB8FE9CD-F977-F0CD-6047-D33D4B6A70B8}"/>
+                <a16:creationId xmlns:a16="http://schemas.microsoft.com/office/drawing/2014/main" id="{FA6AEE4D-350C-C74E-B9CD-A09783A8466C}"/>
               </a:ext>
             </a:extLst>
           </p:cNvPr>
@@ -12076,8 +12045,56 @@
         </p:nvSpPr>
         <p:spPr>
           <a:xfrm>
-            <a:off x="2117335" y="3424420"/>
-            <a:ext cx="3344013" cy="340519"/>
+            <a:off x="2091361" y="3207536"/>
+            <a:ext cx="3344013" cy="817245"/>
+          </a:xfrm>
+          <a:prstGeom prst="roundRect">
+            <a:avLst/>
+          </a:prstGeom>
+          <a:solidFill>
+            <a:schemeClr val="bg1">
+              <a:lumMod val="95000"/>
+            </a:schemeClr>
+          </a:solidFill>
+        </p:spPr>
+        <p:txBody>
+          <a:bodyPr wrap="square">
+            <a:spAutoFit/>
+          </a:bodyPr>
+          <a:lstStyle/>
+          <a:p>
+            <a:pPr algn="just"/>
+            <a:r>
+              <a:rPr lang="es-MX" sz="1400" b="1" dirty="0">
+                <a:latin typeface="Century Gothic" panose="020B0502020202020204" pitchFamily="34" charset="0"/>
+              </a:rPr>
+              <a:t>Facultad propuesta:</a:t>
+            </a:r>
+            <a:r>
+              <a:rPr lang="es-MX" sz="1400" dirty="0">
+                <a:latin typeface="Century Gothic" panose="020B0502020202020204" pitchFamily="34" charset="0"/>
+              </a:rPr>
+              <a:t> Facultad de Ciencias Económicas y Administrativas</a:t>
+            </a:r>
+          </a:p>
+        </p:txBody>
+      </p:sp>
+      <p:sp>
+        <p:nvSpPr>
+          <p:cNvPr id="15" name="CuadroTexto 14">
+            <a:extLst>
+              <a:ext uri="{FF2B5EF4-FFF2-40B4-BE49-F238E27FC236}">
+                <a16:creationId xmlns:a16="http://schemas.microsoft.com/office/drawing/2014/main" id="{38BB9B56-7ADA-517C-7C0F-D1196166F5E9}"/>
+              </a:ext>
+            </a:extLst>
+          </p:cNvPr>
+          <p:cNvSpPr txBox="1"/>
+          <p:nvPr/>
+        </p:nvSpPr>
+        <p:spPr>
+          <a:xfrm>
+            <a:off x="7857943" y="4603121"/>
+            <a:ext cx="3301053" cy="578882"/>
           </a:xfrm>
           <a:prstGeom prst="roundRect">
             <a:avLst/>
@@ -12099,56 +12116,14 @@
               <a:rPr lang="es-MX" sz="1400" b="1">
                 <a:latin typeface="Century Gothic" panose="020B0502020202020204" pitchFamily="34" charset="0"/>
               </a:rPr>
-              <a:t>Facultad propuesta:</a:t>
+              <a:t>Facultad proponente: </a:t>
             </a:r>
-            <a:endParaRPr lang="es-MX" sz="1400">
-              <a:latin typeface="Century Gothic" panose="020B0502020202020204" pitchFamily="34" charset="0"/>
-            </a:endParaRPr>
-          </a:p>
-        </p:txBody>
-      </p:sp>
-      <p:sp>
-        <p:nvSpPr>
-          <p:cNvPr id="15" name="CuadroTexto 14">
-            <a:extLst>
-              <a:ext uri="{FF2B5EF4-FFF2-40B4-BE49-F238E27FC236}">
-                <a16:creationId xmlns:a16="http://schemas.microsoft.com/office/drawing/2014/main" id="{EAF9BFC9-5EAD-A142-69C5-58353C4AC899}"/>
-              </a:ext>
-            </a:extLst>
-          </p:cNvPr>
-          <p:cNvSpPr txBox="1"/>
-          <p:nvPr/>
-        </p:nvSpPr>
-        <p:spPr>
-          <a:xfrm>
-            <a:off x="7857943" y="4603121"/>
-            <a:ext cx="3301055" cy="340519"/>
-          </a:xfrm>
-          <a:prstGeom prst="roundRect">
-            <a:avLst/>
-          </a:prstGeom>
-          <a:solidFill>
-            <a:schemeClr val="bg1">
-              <a:lumMod val="95000"/>
-            </a:schemeClr>
-          </a:solidFill>
-        </p:spPr>
-        <p:txBody>
-          <a:bodyPr wrap="square">
-            <a:spAutoFit/>
-          </a:bodyPr>
-          <a:lstStyle/>
-          <a:p>
-            <a:pPr algn="just"/>
             <a:r>
-              <a:rPr lang="es-MX" sz="1400" b="1">
+              <a:rPr lang="es-MX" sz="1400">
                 <a:latin typeface="Century Gothic" panose="020B0502020202020204" pitchFamily="34" charset="0"/>
               </a:rPr>
-              <a:t>Facultad proponente:</a:t>
+              <a:t>Facultad de Ingenierías y Ciencias Aplicadas</a:t>
             </a:r>
-            <a:endParaRPr lang="es-MX" sz="1400">
-              <a:latin typeface="Century Gothic" panose="020B0502020202020204" pitchFamily="34" charset="0"/>
-            </a:endParaRPr>
           </a:p>
         </p:txBody>
       </p:sp>
@@ -12157,7 +12132,7 @@
           <p:cNvPr id="17" name="Imagen 16">
             <a:extLst>
               <a:ext uri="{FF2B5EF4-FFF2-40B4-BE49-F238E27FC236}">
-                <a16:creationId xmlns:a16="http://schemas.microsoft.com/office/drawing/2014/main" id="{C3C86FF3-A32A-DE9C-08A5-5014E9A057C0}"/>
+                <a16:creationId xmlns:a16="http://schemas.microsoft.com/office/drawing/2014/main" id="{FB193152-9AC7-C69A-66D6-280F1AA1BBB7}"/>
               </a:ext>
             </a:extLst>
           </p:cNvPr>
@@ -12174,8 +12149,8 @@
         </p:blipFill>
         <p:spPr>
           <a:xfrm>
-            <a:off x="755137" y="3207536"/>
-            <a:ext cx="720000" cy="720000"/>
+            <a:off x="1272669" y="3305728"/>
+            <a:ext cx="560007" cy="560007"/>
           </a:xfrm>
           <a:prstGeom prst="rect">
             <a:avLst/>
@@ -12187,7 +12162,7 @@
           <p:cNvPr id="19" name="Imagen 18">
             <a:extLst>
               <a:ext uri="{FF2B5EF4-FFF2-40B4-BE49-F238E27FC236}">
-                <a16:creationId xmlns:a16="http://schemas.microsoft.com/office/drawing/2014/main" id="{8ECF1019-8B2D-699F-811D-1D843E009539}"/>
+                <a16:creationId xmlns:a16="http://schemas.microsoft.com/office/drawing/2014/main" id="{F102B0D9-1244-C16A-52D3-67518C75A185}"/>
               </a:ext>
             </a:extLst>
           </p:cNvPr>
@@ -12204,8 +12179,8 @@
         </p:blipFill>
         <p:spPr>
           <a:xfrm>
-            <a:off x="6677491" y="4394266"/>
-            <a:ext cx="720000" cy="720000"/>
+            <a:off x="7117487" y="4609721"/>
+            <a:ext cx="560007" cy="560007"/>
           </a:xfrm>
           <a:prstGeom prst="rect">
             <a:avLst/>
@@ -12217,7 +12192,7 @@
           <p:cNvPr id="21" name="CuadroTexto 20">
             <a:extLst>
               <a:ext uri="{FF2B5EF4-FFF2-40B4-BE49-F238E27FC236}">
-                <a16:creationId xmlns:a16="http://schemas.microsoft.com/office/drawing/2014/main" id="{FAF17A27-AC96-BBB1-F325-2FA5768A9AA4}"/>
+                <a16:creationId xmlns:a16="http://schemas.microsoft.com/office/drawing/2014/main" id="{A1101ECB-A3B2-7F94-ABEE-0B13E8EB4CD7}"/>
               </a:ext>
             </a:extLst>
           </p:cNvPr>
@@ -12226,8 +12201,8 @@
         </p:nvSpPr>
         <p:spPr>
           <a:xfrm>
-            <a:off x="7857941" y="5710089"/>
-            <a:ext cx="3301055" cy="340519"/>
+            <a:off x="7857941" y="5757474"/>
+            <a:ext cx="3301055" cy="578882"/>
           </a:xfrm>
           <a:prstGeom prst="roundRect">
             <a:avLst/>
@@ -12251,9 +12226,12 @@
               </a:rPr>
               <a:t>Cargo proponente:</a:t>
             </a:r>
-            <a:endParaRPr lang="es-MX" sz="1400">
-              <a:latin typeface="Century Gothic" panose="020B0502020202020204" pitchFamily="34" charset="0"/>
-            </a:endParaRPr>
+            <a:r>
+              <a:rPr lang="es-MX" sz="1400">
+                <a:latin typeface="Century Gothic" panose="020B0502020202020204" pitchFamily="34" charset="0"/>
+              </a:rPr>
+              <a:t> Coordinador de la carrera de Software</a:t>
+            </a:r>
           </a:p>
         </p:txBody>
       </p:sp>
@@ -12262,7 +12240,7 @@
           <p:cNvPr id="23" name="Imagen 22">
             <a:extLst>
               <a:ext uri="{FF2B5EF4-FFF2-40B4-BE49-F238E27FC236}">
-                <a16:creationId xmlns:a16="http://schemas.microsoft.com/office/drawing/2014/main" id="{1B219217-D7BC-C0FA-878A-723A1E7062BE}"/>
+                <a16:creationId xmlns:a16="http://schemas.microsoft.com/office/drawing/2014/main" id="{8EF351A1-4F61-FCB0-75B3-6F0936F95896}"/>
               </a:ext>
             </a:extLst>
           </p:cNvPr>
@@ -12279,18 +12257,70 @@
         </p:blipFill>
         <p:spPr>
           <a:xfrm>
-            <a:off x="6677491" y="5520349"/>
-            <a:ext cx="720000" cy="720000"/>
+            <a:off x="7117487" y="5757474"/>
+            <a:ext cx="560008" cy="560008"/>
           </a:xfrm>
           <a:prstGeom prst="rect">
             <a:avLst/>
           </a:prstGeom>
         </p:spPr>
       </p:pic>
+      <p:sp>
+        <p:nvSpPr>
+          <p:cNvPr id="5" name="Rectángulo 4">
+            <a:extLst>
+              <a:ext uri="{FF2B5EF4-FFF2-40B4-BE49-F238E27FC236}">
+                <a16:creationId xmlns:a16="http://schemas.microsoft.com/office/drawing/2014/main" id="{2C97FD69-08E6-BEDC-F583-FD99CE16EC8E}"/>
+              </a:ext>
+            </a:extLst>
+          </p:cNvPr>
+          <p:cNvSpPr/>
+          <p:nvPr/>
+        </p:nvSpPr>
+        <p:spPr>
+          <a:xfrm>
+            <a:off x="475989" y="388307"/>
+            <a:ext cx="90157" cy="481338"/>
+          </a:xfrm>
+          <a:prstGeom prst="rect">
+            <a:avLst/>
+          </a:prstGeom>
+          <a:solidFill>
+            <a:srgbClr val="A5133D"/>
+          </a:solidFill>
+          <a:ln>
+            <a:noFill/>
+          </a:ln>
+        </p:spPr>
+        <p:style>
+          <a:lnRef idx="2">
+            <a:schemeClr val="accent1">
+              <a:shade val="15000"/>
+            </a:schemeClr>
+          </a:lnRef>
+          <a:fillRef idx="1">
+            <a:schemeClr val="accent1"/>
+          </a:fillRef>
+          <a:effectRef idx="0">
+            <a:schemeClr val="accent1"/>
+          </a:effectRef>
+          <a:fontRef idx="minor">
+            <a:schemeClr val="lt1"/>
+          </a:fontRef>
+        </p:style>
+        <p:txBody>
+          <a:bodyPr rtlCol="0" anchor="ctr"/>
+          <a:lstStyle/>
+          <a:p>
+            <a:pPr algn="ctr"/>
+            <a:endParaRPr lang="es-EC"/>
+          </a:p>
+        </p:txBody>
+      </p:sp>
     </p:spTree>
     <p:extLst>
       <p:ext uri="{BB962C8B-B14F-4D97-AF65-F5344CB8AC3E}">
-        <p14:creationId xmlns:p14="http://schemas.microsoft.com/office/powerpoint/2010/main" val="800599192"/>
+        <p14:creationId xmlns:p14="http://schemas.microsoft.com/office/powerpoint/2010/main" val="1165654531"/>
       </p:ext>
     </p:extLst>
   </p:cSld>
@@ -12324,7 +12354,7 @@
                             </p:stCondLst>
                             <p:childTnLst>
                               <p:par>
-                                <p:cTn id="5" presetID="53" presetClass="entr" presetSubtype="16" fill="hold" nodeType="afterEffect">
+                                <p:cTn id="5" presetID="42" presetClass="entr" presetSubtype="0" fill="hold" grpId="0" nodeType="withEffect">
                                   <p:stCondLst>
                                     <p:cond delay="0"/>
                                   </p:stCondLst>
@@ -12332,87 +12362,6 @@
                                     <p:set>
                                       <p:cBhvr>
                                         <p:cTn id="6" dur="1" fill="hold">
-                                          <p:stCondLst>
-                                            <p:cond delay="0"/>
-                                          </p:stCondLst>
-                                        </p:cTn>
-                                        <p:tgtEl>
-                                          <p:spTgt spid="4"/>
-                                        </p:tgtEl>
-                                        <p:attrNameLst>
-                                          <p:attrName>style.visibility</p:attrName>
-                                        </p:attrNameLst>
-                                      </p:cBhvr>
-                                      <p:to>
-                                        <p:strVal val="visible"/>
-                                      </p:to>
-                                    </p:set>
-                                    <p:anim calcmode="lin" valueType="num">
-                                      <p:cBhvr>
-                                        <p:cTn id="7" dur="500" fill="hold"/>
-                                        <p:tgtEl>
-                                          <p:spTgt spid="4"/>
-                                        </p:tgtEl>
-                                        <p:attrNameLst>
-                                          <p:attrName>ppt_w</p:attrName>
-                                        </p:attrNameLst>
-                                      </p:cBhvr>
-                                      <p:tavLst>
-                                        <p:tav tm="0">
-                                          <p:val>
-                                            <p:fltVal val="0"/>
-                                          </p:val>
-                                        </p:tav>
-                                        <p:tav tm="100000">
-                                          <p:val>
-                                            <p:strVal val="#ppt_w"/>
-                                          </p:val>
-                                        </p:tav>
-                                      </p:tavLst>
-                                    </p:anim>
-                                    <p:anim calcmode="lin" valueType="num">
-                                      <p:cBhvr>
-                                        <p:cTn id="8" dur="500" fill="hold"/>
-                                        <p:tgtEl>
-                                          <p:spTgt spid="4"/>
-                                        </p:tgtEl>
-                                        <p:attrNameLst>
-                                          <p:attrName>ppt_h</p:attrName>
-                                        </p:attrNameLst>
-                                      </p:cBhvr>
-                                      <p:tavLst>
-                                        <p:tav tm="0">
-                                          <p:val>
-                                            <p:fltVal val="0"/>
-                                          </p:val>
-                                        </p:tav>
-                                        <p:tav tm="100000">
-                                          <p:val>
-                                            <p:strVal val="#ppt_h"/>
-                                          </p:val>
-                                        </p:tav>
-                                      </p:tavLst>
-                                    </p:anim>
-                                    <p:animEffect transition="in" filter="fade">
-                                      <p:cBhvr>
-                                        <p:cTn id="9" dur="500"/>
-                                        <p:tgtEl>
-                                          <p:spTgt spid="4"/>
-                                        </p:tgtEl>
-                                      </p:cBhvr>
-                                    </p:animEffect>
-                                  </p:childTnLst>
-                                </p:cTn>
-                              </p:par>
-                              <p:par>
-                                <p:cTn id="10" presetID="42" presetClass="entr" presetSubtype="0" fill="hold" grpId="0" nodeType="withEffect">
-                                  <p:stCondLst>
-                                    <p:cond delay="0"/>
-                                  </p:stCondLst>
-                                  <p:childTnLst>
-                                    <p:set>
-                                      <p:cBhvr>
-                                        <p:cTn id="11" dur="1" fill="hold">
                                           <p:stCondLst>
                                             <p:cond delay="0"/>
                                           </p:stCondLst>
@@ -12434,7 +12383,7 @@
                                     </p:set>
                                     <p:animEffect transition="in" filter="fade">
                                       <p:cBhvr>
-                                        <p:cTn id="12" dur="600"/>
+                                        <p:cTn id="7" dur="600"/>
                                         <p:tgtEl>
                                           <p:spTgt spid="2">
                                             <p:txEl>
@@ -12446,7 +12395,7 @@
                                     </p:animEffect>
                                     <p:anim calcmode="lin" valueType="num">
                                       <p:cBhvr>
-                                        <p:cTn id="13" dur="600" fill="hold"/>
+                                        <p:cTn id="8" dur="600" fill="hold"/>
                                         <p:tgtEl>
                                           <p:spTgt spid="2">
                                             <p:txEl>
@@ -12473,7 +12422,7 @@
                                     </p:anim>
                                     <p:anim calcmode="lin" valueType="num">
                                       <p:cBhvr>
-                                        <p:cTn id="14" dur="600" fill="hold"/>
+                                        <p:cTn id="9" dur="600" fill="hold"/>
                                         <p:tgtEl>
                                           <p:spTgt spid="2">
                                             <p:txEl>
@@ -25638,20 +25587,20 @@
 </file>
 
 <file path=customXml/item1.xml><?xml version="1.0" encoding="utf-8"?>
-<p:properties xmlns:p="http://schemas.microsoft.com/office/2006/metadata/properties" xmlns:xsi="http://www.w3.org/2001/XMLSchema-instance" xmlns:pc="http://schemas.microsoft.com/office/infopath/2007/PartnerControls">
-  <documentManagement>
-    <_activity xmlns="2a3a48df-fd5a-482e-a9d8-c269fe9c14b6" xsi:nil="true"/>
-  </documentManagement>
-</p:properties>
-</file>
-
-<file path=customXml/item2.xml><?xml version="1.0" encoding="utf-8"?>
 <?mso-contentType ?>
 <FormTemplates xmlns="http://schemas.microsoft.com/sharepoint/v3/contenttype/forms">
   <Display>DocumentLibraryForm</Display>
   <Edit>DocumentLibraryForm</Edit>
   <New>DocumentLibraryForm</New>
 </FormTemplates>
+</file>
+
+<file path=customXml/item2.xml><?xml version="1.0" encoding="utf-8"?>
+<p:properties xmlns:p="http://schemas.microsoft.com/office/2006/metadata/properties" xmlns:xsi="http://www.w3.org/2001/XMLSchema-instance" xmlns:pc="http://schemas.microsoft.com/office/infopath/2007/PartnerControls">
+  <documentManagement>
+    <_activity xmlns="2a3a48df-fd5a-482e-a9d8-c269fe9c14b6" xsi:nil="true"/>
+  </documentManagement>
+</p:properties>
 </file>
 
 <file path=customXml/item3.xml><?xml version="1.0" encoding="utf-8"?>
@@ -25888,6 +25837,14 @@
 </file>
 
 <file path=customXml/itemProps1.xml><?xml version="1.0" encoding="utf-8"?>
+<ds:datastoreItem xmlns:ds="http://schemas.openxmlformats.org/officeDocument/2006/customXml" ds:itemID="{67692C38-CDF4-4052-A640-AB9401404604}">
+  <ds:schemaRefs>
+    <ds:schemaRef ds:uri="http://schemas.microsoft.com/sharepoint/v3/contenttype/forms"/>
+  </ds:schemaRefs>
+</ds:datastoreItem>
+</file>
+
+<file path=customXml/itemProps2.xml><?xml version="1.0" encoding="utf-8"?>
 <ds:datastoreItem xmlns:ds="http://schemas.openxmlformats.org/officeDocument/2006/customXml" ds:itemID="{F5600CF1-25B4-4222-B369-2ED59CA2296E}">
   <ds:schemaRefs>
     <ds:schemaRef ds:uri="http://purl.org/dc/dcmitype/"/>
@@ -25900,14 +25857,6 @@
     <ds:schemaRef ds:uri="http://schemas.openxmlformats.org/package/2006/metadata/core-properties"/>
     <ds:schemaRef ds:uri="http://schemas.microsoft.com/office/infopath/2007/PartnerControls"/>
     <ds:schemaRef ds:uri="http://www.w3.org/XML/1998/namespace"/>
-  </ds:schemaRefs>
-</ds:datastoreItem>
-</file>
-
-<file path=customXml/itemProps2.xml><?xml version="1.0" encoding="utf-8"?>
-<ds:datastoreItem xmlns:ds="http://schemas.openxmlformats.org/officeDocument/2006/customXml" ds:itemID="{67692C38-CDF4-4052-A640-AB9401404604}">
-  <ds:schemaRefs>
-    <ds:schemaRef ds:uri="http://schemas.microsoft.com/sharepoint/v3/contenttype/forms"/>
   </ds:schemaRefs>
 </ds:datastoreItem>
 </file>

</xml_diff>

<commit_message>
Add functionality to generate and save a map of Latin America based on location data
</commit_message>
<xml_diff>
--- a/files/base/InvestigacionMercados.pptx
+++ b/files/base/InvestigacionMercados.pptx
@@ -1864,7 +1864,7 @@
           <a:p>
             <a:fld id="{C18CF82C-12A9-4AE1-A40D-061B14899D6E}" type="datetimeFigureOut">
               <a:rPr lang="es-EC" smtClean="0"/>
-              <a:t>14/10/2025</a:t>
+              <a:t>16/10/2025</a:t>
             </a:fld>
             <a:endParaRPr lang="es-EC"/>
           </a:p>
@@ -3208,7 +3208,7 @@
           <a:p>
             <a:fld id="{6C81E8AB-F8E6-46EF-9A6B-58A04613E467}" type="datetimeFigureOut">
               <a:rPr lang="es-EC" smtClean="0"/>
-              <a:t>14/10/2025</a:t>
+              <a:t>16/10/2025</a:t>
             </a:fld>
             <a:endParaRPr lang="es-EC"/>
           </a:p>
@@ -3408,7 +3408,7 @@
           <a:p>
             <a:fld id="{6C81E8AB-F8E6-46EF-9A6B-58A04613E467}" type="datetimeFigureOut">
               <a:rPr lang="es-EC" smtClean="0"/>
-              <a:t>14/10/2025</a:t>
+              <a:t>16/10/2025</a:t>
             </a:fld>
             <a:endParaRPr lang="es-EC"/>
           </a:p>
@@ -3618,7 +3618,7 @@
           <a:p>
             <a:fld id="{6C81E8AB-F8E6-46EF-9A6B-58A04613E467}" type="datetimeFigureOut">
               <a:rPr lang="es-EC" smtClean="0"/>
-              <a:t>14/10/2025</a:t>
+              <a:t>16/10/2025</a:t>
             </a:fld>
             <a:endParaRPr lang="es-EC"/>
           </a:p>
@@ -3919,7 +3919,7 @@
           <a:p>
             <a:fld id="{6C81E8AB-F8E6-46EF-9A6B-58A04613E467}" type="datetimeFigureOut">
               <a:rPr lang="es-EC" smtClean="0"/>
-              <a:t>14/10/2025</a:t>
+              <a:t>16/10/2025</a:t>
             </a:fld>
             <a:endParaRPr lang="es-EC"/>
           </a:p>
@@ -4195,7 +4195,7 @@
           <a:p>
             <a:fld id="{6C81E8AB-F8E6-46EF-9A6B-58A04613E467}" type="datetimeFigureOut">
               <a:rPr lang="es-EC" smtClean="0"/>
-              <a:t>14/10/2025</a:t>
+              <a:t>16/10/2025</a:t>
             </a:fld>
             <a:endParaRPr lang="es-EC"/>
           </a:p>
@@ -4463,7 +4463,7 @@
           <a:p>
             <a:fld id="{6C81E8AB-F8E6-46EF-9A6B-58A04613E467}" type="datetimeFigureOut">
               <a:rPr lang="es-EC" smtClean="0"/>
-              <a:t>14/10/2025</a:t>
+              <a:t>16/10/2025</a:t>
             </a:fld>
             <a:endParaRPr lang="es-EC"/>
           </a:p>
@@ -4878,7 +4878,7 @@
           <a:p>
             <a:fld id="{6C81E8AB-F8E6-46EF-9A6B-58A04613E467}" type="datetimeFigureOut">
               <a:rPr lang="es-EC" smtClean="0"/>
-              <a:t>14/10/2025</a:t>
+              <a:t>16/10/2025</a:t>
             </a:fld>
             <a:endParaRPr lang="es-EC"/>
           </a:p>
@@ -5020,7 +5020,7 @@
           <a:p>
             <a:fld id="{6C81E8AB-F8E6-46EF-9A6B-58A04613E467}" type="datetimeFigureOut">
               <a:rPr lang="es-EC" smtClean="0"/>
-              <a:t>14/10/2025</a:t>
+              <a:t>16/10/2025</a:t>
             </a:fld>
             <a:endParaRPr lang="es-EC"/>
           </a:p>
@@ -5133,7 +5133,7 @@
           <a:p>
             <a:fld id="{6C81E8AB-F8E6-46EF-9A6B-58A04613E467}" type="datetimeFigureOut">
               <a:rPr lang="es-EC" smtClean="0"/>
-              <a:t>14/10/2025</a:t>
+              <a:t>16/10/2025</a:t>
             </a:fld>
             <a:endParaRPr lang="es-EC"/>
           </a:p>
@@ -5446,7 +5446,7 @@
           <a:p>
             <a:fld id="{6C81E8AB-F8E6-46EF-9A6B-58A04613E467}" type="datetimeFigureOut">
               <a:rPr lang="es-EC" smtClean="0"/>
-              <a:t>14/10/2025</a:t>
+              <a:t>16/10/2025</a:t>
             </a:fld>
             <a:endParaRPr lang="es-EC"/>
           </a:p>
@@ -5735,7 +5735,7 @@
           <a:p>
             <a:fld id="{6C81E8AB-F8E6-46EF-9A6B-58A04613E467}" type="datetimeFigureOut">
               <a:rPr lang="es-EC" smtClean="0"/>
-              <a:t>14/10/2025</a:t>
+              <a:t>16/10/2025</a:t>
             </a:fld>
             <a:endParaRPr lang="es-EC"/>
           </a:p>
@@ -5978,7 +5978,7 @@
           <a:p>
             <a:fld id="{6C81E8AB-F8E6-46EF-9A6B-58A04613E467}" type="datetimeFigureOut">
               <a:rPr lang="es-EC" smtClean="0"/>
-              <a:t>14/10/2025</a:t>
+              <a:t>16/10/2025</a:t>
             </a:fld>
             <a:endParaRPr lang="es-EC"/>
           </a:p>
@@ -16500,10 +16500,10 @@
       </p:sp>
       <p:pic>
         <p:nvPicPr>
-          <p:cNvPr id="6" name="Imagen 5">
+          <p:cNvPr id="16" name="Imagen 15" descr="Mapa&#10;&#10;Descripción generada automáticamente">
             <a:extLst>
               <a:ext uri="{FF2B5EF4-FFF2-40B4-BE49-F238E27FC236}">
-                <a16:creationId xmlns:a16="http://schemas.microsoft.com/office/drawing/2014/main" id="{9503250D-EA50-616F-FF13-295F52C13753}"/>
+                <a16:creationId xmlns:a16="http://schemas.microsoft.com/office/drawing/2014/main" id="{DF3B87C3-4564-8970-9693-B024C9BE8834}"/>
               </a:ext>
             </a:extLst>
           </p:cNvPr>
@@ -16513,16 +16513,21 @@
           <p:nvPr/>
         </p:nvPicPr>
         <p:blipFill>
-          <a:blip r:embed="rId3"/>
-          <a:srcRect l="20355" t="6089" r="29663" b="9650"/>
+          <a:blip r:embed="rId3">
+            <a:extLst>
+              <a:ext uri="{28A0092B-C50C-407E-A947-70E740481C1C}">
+                <a14:useLocalDpi xmlns:a14="http://schemas.microsoft.com/office/drawing/2010/main" val="0"/>
+              </a:ext>
+            </a:extLst>
+          </a:blip>
           <a:stretch>
             <a:fillRect/>
           </a:stretch>
         </p:blipFill>
         <p:spPr>
           <a:xfrm>
-            <a:off x="2147919" y="1569778"/>
-            <a:ext cx="3283249" cy="4433919"/>
+            <a:off x="993586" y="1177782"/>
+            <a:ext cx="5319567" cy="5604818"/>
           </a:xfrm>
           <a:prstGeom prst="rect">
             <a:avLst/>
@@ -25587,20 +25592,20 @@
 </file>
 
 <file path=customXml/item1.xml><?xml version="1.0" encoding="utf-8"?>
+<p:properties xmlns:p="http://schemas.microsoft.com/office/2006/metadata/properties" xmlns:xsi="http://www.w3.org/2001/XMLSchema-instance" xmlns:pc="http://schemas.microsoft.com/office/infopath/2007/PartnerControls">
+  <documentManagement>
+    <_activity xmlns="2a3a48df-fd5a-482e-a9d8-c269fe9c14b6" xsi:nil="true"/>
+  </documentManagement>
+</p:properties>
+</file>
+
+<file path=customXml/item2.xml><?xml version="1.0" encoding="utf-8"?>
 <?mso-contentType ?>
 <FormTemplates xmlns="http://schemas.microsoft.com/sharepoint/v3/contenttype/forms">
   <Display>DocumentLibraryForm</Display>
   <Edit>DocumentLibraryForm</Edit>
   <New>DocumentLibraryForm</New>
 </FormTemplates>
-</file>
-
-<file path=customXml/item2.xml><?xml version="1.0" encoding="utf-8"?>
-<p:properties xmlns:p="http://schemas.microsoft.com/office/2006/metadata/properties" xmlns:xsi="http://www.w3.org/2001/XMLSchema-instance" xmlns:pc="http://schemas.microsoft.com/office/infopath/2007/PartnerControls">
-  <documentManagement>
-    <_activity xmlns="2a3a48df-fd5a-482e-a9d8-c269fe9c14b6" xsi:nil="true"/>
-  </documentManagement>
-</p:properties>
 </file>
 
 <file path=customXml/item3.xml><?xml version="1.0" encoding="utf-8"?>
@@ -25837,14 +25842,6 @@
 </file>
 
 <file path=customXml/itemProps1.xml><?xml version="1.0" encoding="utf-8"?>
-<ds:datastoreItem xmlns:ds="http://schemas.openxmlformats.org/officeDocument/2006/customXml" ds:itemID="{67692C38-CDF4-4052-A640-AB9401404604}">
-  <ds:schemaRefs>
-    <ds:schemaRef ds:uri="http://schemas.microsoft.com/sharepoint/v3/contenttype/forms"/>
-  </ds:schemaRefs>
-</ds:datastoreItem>
-</file>
-
-<file path=customXml/itemProps2.xml><?xml version="1.0" encoding="utf-8"?>
 <ds:datastoreItem xmlns:ds="http://schemas.openxmlformats.org/officeDocument/2006/customXml" ds:itemID="{F5600CF1-25B4-4222-B369-2ED59CA2296E}">
   <ds:schemaRefs>
     <ds:schemaRef ds:uri="http://purl.org/dc/dcmitype/"/>
@@ -25857,6 +25854,14 @@
     <ds:schemaRef ds:uri="http://schemas.openxmlformats.org/package/2006/metadata/core-properties"/>
     <ds:schemaRef ds:uri="http://schemas.microsoft.com/office/infopath/2007/PartnerControls"/>
     <ds:schemaRef ds:uri="http://www.w3.org/XML/1998/namespace"/>
+  </ds:schemaRefs>
+</ds:datastoreItem>
+</file>
+
+<file path=customXml/itemProps2.xml><?xml version="1.0" encoding="utf-8"?>
+<ds:datastoreItem xmlns:ds="http://schemas.openxmlformats.org/officeDocument/2006/customXml" ds:itemID="{67692C38-CDF4-4052-A640-AB9401404604}">
+  <ds:schemaRefs>
+    <ds:schemaRef ds:uri="http://schemas.microsoft.com/sharepoint/v3/contenttype/forms"/>
   </ds:schemaRefs>
 </ds:datastoreItem>
 </file>

</xml_diff>

<commit_message>
Enhance PPTX report generation by inserting skills data into slide tables and updating evaluation metrics in slide 9
</commit_message>
<xml_diff>
--- a/files/base/InvestigacionMercados.pptx
+++ b/files/base/InvestigacionMercados.pptx
@@ -6715,7 +6715,7 @@
           <p:nvPr>
             <p:extLst>
               <p:ext uri="{D42A27DB-BD31-4B8C-83A1-F6EECF244321}">
-                <p14:modId xmlns:p14="http://schemas.microsoft.com/office/powerpoint/2010/main" val="503138616"/>
+                <p14:modId xmlns:p14="http://schemas.microsoft.com/office/powerpoint/2010/main" val="1962270395"/>
               </p:ext>
             </p:extLst>
           </p:nvPr>
@@ -7523,6 +7523,17 @@
                     <a:lstStyle/>
                     <a:p>
                       <a:pPr algn="ctr"/>
+                      <a:r>
+                        <a:rPr lang="en-US" sz="1200" dirty="0">
+                          <a:solidFill>
+                            <a:schemeClr val="bg1">
+                              <a:lumMod val="50000"/>
+                            </a:schemeClr>
+                          </a:solidFill>
+                          <a:latin typeface="Century Gothic" panose="020B0502020202020204" pitchFamily="34" charset="0"/>
+                        </a:rPr>
+                        <a:t>10%</a:t>
+                      </a:r>
                       <a:endParaRPr lang="es-EC" sz="1200" dirty="0">
                         <a:solidFill>
                           <a:schemeClr val="bg1">
@@ -7585,14 +7596,57 @@
                     <a:bodyPr/>
                     <a:lstStyle/>
                     <a:p>
-                      <a:pPr algn="ctr"/>
-                      <a:endParaRPr lang="es-EC" sz="1200" dirty="0">
+                      <a:pPr marL="0" marR="0" lvl="0" indent="0" algn="ctr" defTabSz="914400" rtl="0" eaLnBrk="1" fontAlgn="auto" latinLnBrk="0" hangingPunct="1">
+                        <a:lnSpc>
+                          <a:spcPct val="100000"/>
+                        </a:lnSpc>
+                        <a:spcBef>
+                          <a:spcPts val="0"/>
+                        </a:spcBef>
+                        <a:spcAft>
+                          <a:spcPts val="0"/>
+                        </a:spcAft>
+                        <a:buClrTx/>
+                        <a:buSzTx/>
+                        <a:buFontTx/>
+                        <a:buNone/>
+                        <a:tabLst/>
+                        <a:defRPr/>
+                      </a:pPr>
+                      <a:r>
+                        <a:rPr kumimoji="0" lang="en-US" sz="1200" b="0" i="0" u="none" strike="noStrike" kern="1200" cap="none" spc="0" normalizeH="0" baseline="0" noProof="0">
+                          <a:ln>
+                            <a:noFill/>
+                          </a:ln>
+                          <a:solidFill>
+                            <a:prstClr val="white">
+                              <a:lumMod val="50000"/>
+                            </a:prstClr>
+                          </a:solidFill>
+                          <a:effectLst/>
+                          <a:uLnTx/>
+                          <a:uFillTx/>
+                          <a:latin typeface="Century Gothic" panose="020B0502020202020204" pitchFamily="34" charset="0"/>
+                          <a:ea typeface="+mn-ea"/>
+                          <a:cs typeface="+mn-cs"/>
+                        </a:rPr>
+                        <a:t>10%</a:t>
+                      </a:r>
+                      <a:endParaRPr kumimoji="0" lang="es-EC" sz="1200" b="0" i="0" u="none" strike="noStrike" kern="1200" cap="none" spc="0" normalizeH="0" baseline="0" noProof="0" dirty="0">
+                        <a:ln>
+                          <a:noFill/>
+                        </a:ln>
                         <a:solidFill>
-                          <a:schemeClr val="bg1">
+                          <a:prstClr val="white">
                             <a:lumMod val="50000"/>
-                          </a:schemeClr>
+                          </a:prstClr>
                         </a:solidFill>
+                        <a:effectLst/>
+                        <a:uLnTx/>
+                        <a:uFillTx/>
                         <a:latin typeface="Century Gothic" panose="020B0502020202020204" pitchFamily="34" charset="0"/>
+                        <a:ea typeface="+mn-ea"/>
+                        <a:cs typeface="+mn-cs"/>
                       </a:endParaRPr>
                     </a:p>
                   </a:txBody>
@@ -7790,14 +7844,57 @@
                     <a:bodyPr/>
                     <a:lstStyle/>
                     <a:p>
-                      <a:pPr algn="ctr"/>
-                      <a:endParaRPr lang="es-EC" sz="1200" dirty="0">
+                      <a:pPr marL="0" marR="0" lvl="0" indent="0" algn="ctr" defTabSz="914400" rtl="0" eaLnBrk="1" fontAlgn="auto" latinLnBrk="0" hangingPunct="1">
+                        <a:lnSpc>
+                          <a:spcPct val="100000"/>
+                        </a:lnSpc>
+                        <a:spcBef>
+                          <a:spcPts val="0"/>
+                        </a:spcBef>
+                        <a:spcAft>
+                          <a:spcPts val="0"/>
+                        </a:spcAft>
+                        <a:buClrTx/>
+                        <a:buSzTx/>
+                        <a:buFontTx/>
+                        <a:buNone/>
+                        <a:tabLst/>
+                        <a:defRPr/>
+                      </a:pPr>
+                      <a:r>
+                        <a:rPr kumimoji="0" lang="en-US" sz="1200" b="0" i="0" u="none" strike="noStrike" kern="1200" cap="none" spc="0" normalizeH="0" baseline="0" noProof="0">
+                          <a:ln>
+                            <a:noFill/>
+                          </a:ln>
+                          <a:solidFill>
+                            <a:prstClr val="white">
+                              <a:lumMod val="50000"/>
+                            </a:prstClr>
+                          </a:solidFill>
+                          <a:effectLst/>
+                          <a:uLnTx/>
+                          <a:uFillTx/>
+                          <a:latin typeface="Century Gothic" panose="020B0502020202020204" pitchFamily="34" charset="0"/>
+                          <a:ea typeface="+mn-ea"/>
+                          <a:cs typeface="+mn-cs"/>
+                        </a:rPr>
+                        <a:t>10%</a:t>
+                      </a:r>
+                      <a:endParaRPr kumimoji="0" lang="es-EC" sz="1200" b="0" i="0" u="none" strike="noStrike" kern="1200" cap="none" spc="0" normalizeH="0" baseline="0" noProof="0" dirty="0">
+                        <a:ln>
+                          <a:noFill/>
+                        </a:ln>
                         <a:solidFill>
-                          <a:schemeClr val="bg1">
+                          <a:prstClr val="white">
                             <a:lumMod val="50000"/>
-                          </a:schemeClr>
+                          </a:prstClr>
                         </a:solidFill>
+                        <a:effectLst/>
+                        <a:uLnTx/>
+                        <a:uFillTx/>
                         <a:latin typeface="Century Gothic" panose="020B0502020202020204" pitchFamily="34" charset="0"/>
+                        <a:ea typeface="+mn-ea"/>
+                        <a:cs typeface="+mn-cs"/>
                       </a:endParaRPr>
                     </a:p>
                   </a:txBody>
@@ -7853,14 +7950,57 @@
                     <a:bodyPr/>
                     <a:lstStyle/>
                     <a:p>
-                      <a:pPr algn="ctr"/>
-                      <a:endParaRPr lang="es-EC" sz="1200" dirty="0">
+                      <a:pPr marL="0" marR="0" lvl="0" indent="0" algn="ctr" defTabSz="914400" rtl="0" eaLnBrk="1" fontAlgn="auto" latinLnBrk="0" hangingPunct="1">
+                        <a:lnSpc>
+                          <a:spcPct val="100000"/>
+                        </a:lnSpc>
+                        <a:spcBef>
+                          <a:spcPts val="0"/>
+                        </a:spcBef>
+                        <a:spcAft>
+                          <a:spcPts val="0"/>
+                        </a:spcAft>
+                        <a:buClrTx/>
+                        <a:buSzTx/>
+                        <a:buFontTx/>
+                        <a:buNone/>
+                        <a:tabLst/>
+                        <a:defRPr/>
+                      </a:pPr>
+                      <a:r>
+                        <a:rPr kumimoji="0" lang="en-US" sz="1200" b="0" i="0" u="none" strike="noStrike" kern="1200" cap="none" spc="0" normalizeH="0" baseline="0" noProof="0">
+                          <a:ln>
+                            <a:noFill/>
+                          </a:ln>
+                          <a:solidFill>
+                            <a:prstClr val="white">
+                              <a:lumMod val="50000"/>
+                            </a:prstClr>
+                          </a:solidFill>
+                          <a:effectLst/>
+                          <a:uLnTx/>
+                          <a:uFillTx/>
+                          <a:latin typeface="Century Gothic" panose="020B0502020202020204" pitchFamily="34" charset="0"/>
+                          <a:ea typeface="+mn-ea"/>
+                          <a:cs typeface="+mn-cs"/>
+                        </a:rPr>
+                        <a:t>10%</a:t>
+                      </a:r>
+                      <a:endParaRPr kumimoji="0" lang="es-EC" sz="1200" b="0" i="0" u="none" strike="noStrike" kern="1200" cap="none" spc="0" normalizeH="0" baseline="0" noProof="0" dirty="0">
+                        <a:ln>
+                          <a:noFill/>
+                        </a:ln>
                         <a:solidFill>
-                          <a:schemeClr val="bg1">
+                          <a:prstClr val="white">
                             <a:lumMod val="50000"/>
-                          </a:schemeClr>
+                          </a:prstClr>
                         </a:solidFill>
+                        <a:effectLst/>
+                        <a:uLnTx/>
+                        <a:uFillTx/>
                         <a:latin typeface="Century Gothic" panose="020B0502020202020204" pitchFamily="34" charset="0"/>
+                        <a:ea typeface="+mn-ea"/>
+                        <a:cs typeface="+mn-cs"/>
                       </a:endParaRPr>
                     </a:p>
                   </a:txBody>
@@ -8058,14 +8198,57 @@
                     <a:bodyPr/>
                     <a:lstStyle/>
                     <a:p>
-                      <a:pPr algn="ctr"/>
-                      <a:endParaRPr lang="es-EC" sz="1200" dirty="0">
+                      <a:pPr marL="0" marR="0" lvl="0" indent="0" algn="ctr" defTabSz="914400" rtl="0" eaLnBrk="1" fontAlgn="auto" latinLnBrk="0" hangingPunct="1">
+                        <a:lnSpc>
+                          <a:spcPct val="100000"/>
+                        </a:lnSpc>
+                        <a:spcBef>
+                          <a:spcPts val="0"/>
+                        </a:spcBef>
+                        <a:spcAft>
+                          <a:spcPts val="0"/>
+                        </a:spcAft>
+                        <a:buClrTx/>
+                        <a:buSzTx/>
+                        <a:buFontTx/>
+                        <a:buNone/>
+                        <a:tabLst/>
+                        <a:defRPr/>
+                      </a:pPr>
+                      <a:r>
+                        <a:rPr kumimoji="0" lang="en-US" sz="1200" b="0" i="0" u="none" strike="noStrike" kern="1200" cap="none" spc="0" normalizeH="0" baseline="0" noProof="0">
+                          <a:ln>
+                            <a:noFill/>
+                          </a:ln>
+                          <a:solidFill>
+                            <a:prstClr val="white">
+                              <a:lumMod val="50000"/>
+                            </a:prstClr>
+                          </a:solidFill>
+                          <a:effectLst/>
+                          <a:uLnTx/>
+                          <a:uFillTx/>
+                          <a:latin typeface="Century Gothic" panose="020B0502020202020204" pitchFamily="34" charset="0"/>
+                          <a:ea typeface="+mn-ea"/>
+                          <a:cs typeface="+mn-cs"/>
+                        </a:rPr>
+                        <a:t>10%</a:t>
+                      </a:r>
+                      <a:endParaRPr kumimoji="0" lang="es-EC" sz="1200" b="0" i="0" u="none" strike="noStrike" kern="1200" cap="none" spc="0" normalizeH="0" baseline="0" noProof="0" dirty="0">
+                        <a:ln>
+                          <a:noFill/>
+                        </a:ln>
                         <a:solidFill>
-                          <a:schemeClr val="bg1">
+                          <a:prstClr val="white">
                             <a:lumMod val="50000"/>
-                          </a:schemeClr>
+                          </a:prstClr>
                         </a:solidFill>
+                        <a:effectLst/>
+                        <a:uLnTx/>
+                        <a:uFillTx/>
                         <a:latin typeface="Century Gothic" panose="020B0502020202020204" pitchFamily="34" charset="0"/>
+                        <a:ea typeface="+mn-ea"/>
+                        <a:cs typeface="+mn-cs"/>
                       </a:endParaRPr>
                     </a:p>
                   </a:txBody>
@@ -8121,14 +8304,57 @@
                     <a:bodyPr/>
                     <a:lstStyle/>
                     <a:p>
-                      <a:pPr algn="ctr"/>
-                      <a:endParaRPr lang="es-EC" sz="1200" dirty="0">
+                      <a:pPr marL="0" marR="0" lvl="0" indent="0" algn="ctr" defTabSz="914400" rtl="0" eaLnBrk="1" fontAlgn="auto" latinLnBrk="0" hangingPunct="1">
+                        <a:lnSpc>
+                          <a:spcPct val="100000"/>
+                        </a:lnSpc>
+                        <a:spcBef>
+                          <a:spcPts val="0"/>
+                        </a:spcBef>
+                        <a:spcAft>
+                          <a:spcPts val="0"/>
+                        </a:spcAft>
+                        <a:buClrTx/>
+                        <a:buSzTx/>
+                        <a:buFontTx/>
+                        <a:buNone/>
+                        <a:tabLst/>
+                        <a:defRPr/>
+                      </a:pPr>
+                      <a:r>
+                        <a:rPr kumimoji="0" lang="en-US" sz="1200" b="0" i="0" u="none" strike="noStrike" kern="1200" cap="none" spc="0" normalizeH="0" baseline="0" noProof="0">
+                          <a:ln>
+                            <a:noFill/>
+                          </a:ln>
+                          <a:solidFill>
+                            <a:prstClr val="white">
+                              <a:lumMod val="50000"/>
+                            </a:prstClr>
+                          </a:solidFill>
+                          <a:effectLst/>
+                          <a:uLnTx/>
+                          <a:uFillTx/>
+                          <a:latin typeface="Century Gothic" panose="020B0502020202020204" pitchFamily="34" charset="0"/>
+                          <a:ea typeface="+mn-ea"/>
+                          <a:cs typeface="+mn-cs"/>
+                        </a:rPr>
+                        <a:t>10%</a:t>
+                      </a:r>
+                      <a:endParaRPr kumimoji="0" lang="es-EC" sz="1200" b="0" i="0" u="none" strike="noStrike" kern="1200" cap="none" spc="0" normalizeH="0" baseline="0" noProof="0" dirty="0">
+                        <a:ln>
+                          <a:noFill/>
+                        </a:ln>
                         <a:solidFill>
-                          <a:schemeClr val="bg1">
+                          <a:prstClr val="white">
                             <a:lumMod val="50000"/>
-                          </a:schemeClr>
+                          </a:prstClr>
                         </a:solidFill>
+                        <a:effectLst/>
+                        <a:uLnTx/>
+                        <a:uFillTx/>
                         <a:latin typeface="Century Gothic" panose="020B0502020202020204" pitchFamily="34" charset="0"/>
+                        <a:ea typeface="+mn-ea"/>
+                        <a:cs typeface="+mn-cs"/>
                       </a:endParaRPr>
                     </a:p>
                   </a:txBody>
@@ -8326,14 +8552,57 @@
                     <a:bodyPr/>
                     <a:lstStyle/>
                     <a:p>
-                      <a:pPr algn="ctr"/>
-                      <a:endParaRPr lang="es-EC" sz="1200" dirty="0">
+                      <a:pPr marL="0" marR="0" lvl="0" indent="0" algn="ctr" defTabSz="914400" rtl="0" eaLnBrk="1" fontAlgn="auto" latinLnBrk="0" hangingPunct="1">
+                        <a:lnSpc>
+                          <a:spcPct val="100000"/>
+                        </a:lnSpc>
+                        <a:spcBef>
+                          <a:spcPts val="0"/>
+                        </a:spcBef>
+                        <a:spcAft>
+                          <a:spcPts val="0"/>
+                        </a:spcAft>
+                        <a:buClrTx/>
+                        <a:buSzTx/>
+                        <a:buFontTx/>
+                        <a:buNone/>
+                        <a:tabLst/>
+                        <a:defRPr/>
+                      </a:pPr>
+                      <a:r>
+                        <a:rPr kumimoji="0" lang="en-US" sz="1200" b="0" i="0" u="none" strike="noStrike" kern="1200" cap="none" spc="0" normalizeH="0" baseline="0" noProof="0" dirty="0">
+                          <a:ln>
+                            <a:noFill/>
+                          </a:ln>
+                          <a:solidFill>
+                            <a:prstClr val="white">
+                              <a:lumMod val="50000"/>
+                            </a:prstClr>
+                          </a:solidFill>
+                          <a:effectLst/>
+                          <a:uLnTx/>
+                          <a:uFillTx/>
+                          <a:latin typeface="Century Gothic" panose="020B0502020202020204" pitchFamily="34" charset="0"/>
+                          <a:ea typeface="+mn-ea"/>
+                          <a:cs typeface="+mn-cs"/>
+                        </a:rPr>
+                        <a:t>10%</a:t>
+                      </a:r>
+                      <a:endParaRPr kumimoji="0" lang="es-EC" sz="1200" b="0" i="0" u="none" strike="noStrike" kern="1200" cap="none" spc="0" normalizeH="0" baseline="0" noProof="0" dirty="0">
+                        <a:ln>
+                          <a:noFill/>
+                        </a:ln>
                         <a:solidFill>
-                          <a:schemeClr val="bg1">
+                          <a:prstClr val="white">
                             <a:lumMod val="50000"/>
-                          </a:schemeClr>
+                          </a:prstClr>
                         </a:solidFill>
+                        <a:effectLst/>
+                        <a:uLnTx/>
+                        <a:uFillTx/>
                         <a:latin typeface="Century Gothic" panose="020B0502020202020204" pitchFamily="34" charset="0"/>
+                        <a:ea typeface="+mn-ea"/>
+                        <a:cs typeface="+mn-cs"/>
                       </a:endParaRPr>
                     </a:p>
                   </a:txBody>
@@ -8389,14 +8658,57 @@
                     <a:bodyPr/>
                     <a:lstStyle/>
                     <a:p>
-                      <a:pPr algn="ctr"/>
-                      <a:endParaRPr lang="es-EC" sz="1200" dirty="0">
+                      <a:pPr marL="0" marR="0" lvl="0" indent="0" algn="ctr" defTabSz="914400" rtl="0" eaLnBrk="1" fontAlgn="auto" latinLnBrk="0" hangingPunct="1">
+                        <a:lnSpc>
+                          <a:spcPct val="100000"/>
+                        </a:lnSpc>
+                        <a:spcBef>
+                          <a:spcPts val="0"/>
+                        </a:spcBef>
+                        <a:spcAft>
+                          <a:spcPts val="0"/>
+                        </a:spcAft>
+                        <a:buClrTx/>
+                        <a:buSzTx/>
+                        <a:buFontTx/>
+                        <a:buNone/>
+                        <a:tabLst/>
+                        <a:defRPr/>
+                      </a:pPr>
+                      <a:r>
+                        <a:rPr kumimoji="0" lang="en-US" sz="1200" b="0" i="0" u="none" strike="noStrike" kern="1200" cap="none" spc="0" normalizeH="0" baseline="0" noProof="0" dirty="0">
+                          <a:ln>
+                            <a:noFill/>
+                          </a:ln>
+                          <a:solidFill>
+                            <a:prstClr val="white">
+                              <a:lumMod val="50000"/>
+                            </a:prstClr>
+                          </a:solidFill>
+                          <a:effectLst/>
+                          <a:uLnTx/>
+                          <a:uFillTx/>
+                          <a:latin typeface="Century Gothic" panose="020B0502020202020204" pitchFamily="34" charset="0"/>
+                          <a:ea typeface="+mn-ea"/>
+                          <a:cs typeface="+mn-cs"/>
+                        </a:rPr>
+                        <a:t>10%</a:t>
+                      </a:r>
+                      <a:endParaRPr kumimoji="0" lang="es-EC" sz="1200" b="0" i="0" u="none" strike="noStrike" kern="1200" cap="none" spc="0" normalizeH="0" baseline="0" noProof="0" dirty="0">
+                        <a:ln>
+                          <a:noFill/>
+                        </a:ln>
                         <a:solidFill>
-                          <a:schemeClr val="bg1">
+                          <a:prstClr val="white">
                             <a:lumMod val="50000"/>
-                          </a:schemeClr>
+                          </a:prstClr>
                         </a:solidFill>
+                        <a:effectLst/>
+                        <a:uLnTx/>
+                        <a:uFillTx/>
                         <a:latin typeface="Century Gothic" panose="020B0502020202020204" pitchFamily="34" charset="0"/>
+                        <a:ea typeface="+mn-ea"/>
+                        <a:cs typeface="+mn-cs"/>
                       </a:endParaRPr>
                     </a:p>
                   </a:txBody>
@@ -8598,16 +8910,36 @@
                     <a:bodyPr/>
                     <a:lstStyle/>
                     <a:p>
-                      <a:pPr lvl="0" algn="ctr">
+                      <a:pPr marL="0" marR="0" lvl="0" indent="0" algn="ctr" defTabSz="914400" rtl="0" eaLnBrk="1" fontAlgn="auto" latinLnBrk="0" hangingPunct="1">
+                        <a:lnSpc>
+                          <a:spcPct val="100000"/>
+                        </a:lnSpc>
+                        <a:spcBef>
+                          <a:spcPts val="0"/>
+                        </a:spcBef>
+                        <a:spcAft>
+                          <a:spcPts val="0"/>
+                        </a:spcAft>
+                        <a:buClrTx/>
+                        <a:buSzTx/>
+                        <a:buFontTx/>
                         <a:buNone/>
+                        <a:tabLst/>
+                        <a:defRPr/>
                       </a:pPr>
+                      <a:r>
+                        <a:rPr lang="es-EC" sz="1200" b="1" dirty="0">
+                          <a:solidFill>
+                            <a:schemeClr val="bg1">
+                              <a:lumMod val="50000"/>
+                            </a:schemeClr>
+                          </a:solidFill>
+                          <a:latin typeface="Century Gothic" panose="020B0502020202020204" pitchFamily="34" charset="0"/>
+                        </a:rPr>
+                        <a:t>100%</a:t>
+                      </a:r>
                       <a:endParaRPr lang="es-EC" sz="1200" dirty="0">
-                        <a:solidFill>
-                          <a:schemeClr val="bg1">
-                            <a:lumMod val="50000"/>
-                          </a:schemeClr>
-                        </a:solidFill>
-                        <a:latin typeface="Century Gothic"/>
+                        <a:latin typeface="Century Gothic" panose="020B0502020202020204" pitchFamily="34" charset="0"/>
                       </a:endParaRPr>
                     </a:p>
                   </a:txBody>
@@ -8663,13 +8995,35 @@
                     <a:bodyPr/>
                     <a:lstStyle/>
                     <a:p>
-                      <a:pPr algn="ctr"/>
+                      <a:pPr marL="0" marR="0" lvl="0" indent="0" algn="ctr" defTabSz="914400" rtl="0" eaLnBrk="1" fontAlgn="auto" latinLnBrk="0" hangingPunct="1">
+                        <a:lnSpc>
+                          <a:spcPct val="100000"/>
+                        </a:lnSpc>
+                        <a:spcBef>
+                          <a:spcPts val="0"/>
+                        </a:spcBef>
+                        <a:spcAft>
+                          <a:spcPts val="0"/>
+                        </a:spcAft>
+                        <a:buClrTx/>
+                        <a:buSzTx/>
+                        <a:buFontTx/>
+                        <a:buNone/>
+                        <a:tabLst/>
+                        <a:defRPr/>
+                      </a:pPr>
+                      <a:r>
+                        <a:rPr lang="es-EC" sz="1200" b="1" dirty="0">
+                          <a:solidFill>
+                            <a:schemeClr val="bg1">
+                              <a:lumMod val="50000"/>
+                            </a:schemeClr>
+                          </a:solidFill>
+                          <a:latin typeface="Century Gothic" panose="020B0502020202020204" pitchFamily="34" charset="0"/>
+                        </a:rPr>
+                        <a:t>100%</a:t>
+                      </a:r>
                       <a:endParaRPr lang="es-EC" sz="1200" dirty="0">
-                        <a:solidFill>
-                          <a:schemeClr val="bg1">
-                            <a:lumMod val="50000"/>
-                          </a:schemeClr>
-                        </a:solidFill>
                         <a:latin typeface="Century Gothic" panose="020B0502020202020204" pitchFamily="34" charset="0"/>
                       </a:endParaRPr>
                     </a:p>
@@ -16433,7 +16787,7 @@
           <a:p>
             <a:pPr algn="r"/>
             <a:r>
-              <a:rPr lang="es-EC" sz="800" i="1">
+              <a:rPr lang="es-EC" sz="800" i="1" dirty="0">
                 <a:solidFill>
                   <a:schemeClr val="tx1">
                     <a:lumMod val="50000"/>
@@ -16442,8 +16796,53 @@
                 </a:solidFill>
                 <a:latin typeface="Century Gothic" panose="020B0502020202020204" pitchFamily="34" charset="0"/>
               </a:rPr>
-              <a:t>Fuente: LinkedIn Talent Insights</a:t>
+              <a:t>Fuente: LinkedIn </a:t>
             </a:r>
+            <a:r>
+              <a:rPr lang="es-EC" sz="800" i="1" dirty="0" err="1">
+                <a:solidFill>
+                  <a:schemeClr val="tx1">
+                    <a:lumMod val="50000"/>
+                    <a:lumOff val="50000"/>
+                  </a:schemeClr>
+                </a:solidFill>
+                <a:latin typeface="Century Gothic" panose="020B0502020202020204" pitchFamily="34" charset="0"/>
+              </a:rPr>
+              <a:t>Talent</a:t>
+            </a:r>
+            <a:r>
+              <a:rPr lang="es-EC" sz="800" i="1" dirty="0">
+                <a:solidFill>
+                  <a:schemeClr val="tx1">
+                    <a:lumMod val="50000"/>
+                    <a:lumOff val="50000"/>
+                  </a:schemeClr>
+                </a:solidFill>
+                <a:latin typeface="Century Gothic" panose="020B0502020202020204" pitchFamily="34" charset="0"/>
+              </a:rPr>
+              <a:t> </a:t>
+            </a:r>
+            <a:r>
+              <a:rPr lang="es-EC" sz="800" i="1" dirty="0" err="1">
+                <a:solidFill>
+                  <a:schemeClr val="tx1">
+                    <a:lumMod val="50000"/>
+                    <a:lumOff val="50000"/>
+                  </a:schemeClr>
+                </a:solidFill>
+                <a:latin typeface="Century Gothic" panose="020B0502020202020204" pitchFamily="34" charset="0"/>
+              </a:rPr>
+              <a:t>Insights</a:t>
+            </a:r>
+            <a:endParaRPr lang="es-EC" sz="800" i="1" dirty="0">
+              <a:solidFill>
+                <a:schemeClr val="tx1">
+                  <a:lumMod val="50000"/>
+                  <a:lumOff val="50000"/>
+                </a:schemeClr>
+              </a:solidFill>
+              <a:latin typeface="Century Gothic" panose="020B0502020202020204" pitchFamily="34" charset="0"/>
+            </a:endParaRPr>
           </a:p>
         </p:txBody>
       </p:sp>
@@ -18220,14 +18619,14 @@
           <p:nvPr>
             <p:extLst>
               <p:ext uri="{D42A27DB-BD31-4B8C-83A1-F6EECF244321}">
-                <p14:modId xmlns:p14="http://schemas.microsoft.com/office/powerpoint/2010/main" val="2886836711"/>
+                <p14:modId xmlns:p14="http://schemas.microsoft.com/office/powerpoint/2010/main" val="2056542434"/>
               </p:ext>
             </p:extLst>
           </p:nvPr>
         </p:nvGraphicFramePr>
         <p:xfrm>
           <a:off x="575703" y="1755355"/>
-          <a:ext cx="10775651" cy="3746940"/>
+          <a:ext cx="10775651" cy="3749333"/>
         </p:xfrm>
         <a:graphic>
           <a:graphicData uri="http://schemas.openxmlformats.org/drawingml/2006/table">
@@ -18906,13 +19305,16 @@
                       <a:pPr algn="ctr" fontAlgn="b">
                         <a:buNone/>
                       </a:pPr>
-                      <a:endParaRPr lang="es-EC" sz="1200" b="0" i="0" u="none" strike="noStrike" dirty="0">
-                        <a:solidFill>
-                          <a:srgbClr val="000000"/>
-                        </a:solidFill>
-                        <a:effectLst/>
-                        <a:latin typeface="Century Gothic" panose="020B0502020202020204" pitchFamily="34" charset="0"/>
-                      </a:endParaRPr>
+                      <a:r>
+                        <a:rPr lang="es-EC" sz="1200" b="0" i="0" u="none" strike="noStrike" dirty="0">
+                          <a:solidFill>
+                            <a:srgbClr val="000000"/>
+                          </a:solidFill>
+                          <a:effectLst/>
+                          <a:latin typeface="Century Gothic" panose="020B0502020202020204" pitchFamily="34" charset="0"/>
+                        </a:rPr>
+                        <a:t>Gestión empresarial</a:t>
+                      </a:r>
                     </a:p>
                   </a:txBody>
                   <a:tcPr marL="6350" marR="6350" marT="6350" marB="0" anchor="ctr">
@@ -18981,7 +19383,7 @@
                           <a:effectLst/>
                           <a:latin typeface="Century Gothic" panose="020B0502020202020204" pitchFamily="34" charset="0"/>
                         </a:rPr>
-                        <a:t>%</a:t>
+                        <a:t>8%</a:t>
                       </a:r>
                     </a:p>
                   </a:txBody>
@@ -19108,13 +19510,16 @@
                       <a:pPr algn="ctr" fontAlgn="b">
                         <a:buNone/>
                       </a:pPr>
-                      <a:endParaRPr lang="es-EC" sz="1200" b="0" i="0" u="none" strike="noStrike" dirty="0">
-                        <a:solidFill>
-                          <a:srgbClr val="000000"/>
-                        </a:solidFill>
-                        <a:effectLst/>
-                        <a:latin typeface="Century Gothic" panose="020B0502020202020204" pitchFamily="34" charset="0"/>
-                      </a:endParaRPr>
+                      <a:r>
+                        <a:rPr lang="es-EC" sz="1200" b="0" i="0" u="none" strike="noStrike" dirty="0">
+                          <a:solidFill>
+                            <a:srgbClr val="000000"/>
+                          </a:solidFill>
+                          <a:effectLst/>
+                          <a:latin typeface="Century Gothic" panose="020B0502020202020204" pitchFamily="34" charset="0"/>
+                        </a:rPr>
+                        <a:t>Gestión empresarial</a:t>
+                      </a:r>
                     </a:p>
                   </a:txBody>
                   <a:tcPr marL="6350" marR="6350" marT="6350" marB="0" anchor="ctr">
@@ -19172,54 +19577,19 @@
                     <a:bodyPr/>
                     <a:lstStyle/>
                     <a:p>
-                      <a:pPr marL="0" marR="0" lvl="0" indent="0" algn="ctr" defTabSz="914400" rtl="0" eaLnBrk="1" fontAlgn="b" latinLnBrk="0" hangingPunct="1">
-                        <a:lnSpc>
-                          <a:spcPct val="100000"/>
-                        </a:lnSpc>
-                        <a:spcBef>
-                          <a:spcPts val="0"/>
-                        </a:spcBef>
-                        <a:spcAft>
-                          <a:spcPts val="0"/>
-                        </a:spcAft>
-                        <a:buClrTx/>
-                        <a:buSzTx/>
-                        <a:buFontTx/>
+                      <a:pPr algn="ctr" fontAlgn="b">
                         <a:buNone/>
-                        <a:tabLst/>
-                        <a:defRPr/>
                       </a:pPr>
                       <a:r>
-                        <a:rPr kumimoji="0" lang="es-EC" sz="1200" b="0" i="0" u="none" strike="noStrike" kern="1200" cap="none" spc="0" normalizeH="0" baseline="0" noProof="0">
-                          <a:ln>
-                            <a:noFill/>
-                          </a:ln>
+                        <a:rPr lang="es-EC" sz="1200" b="0" i="0" u="none" strike="noStrike" dirty="0">
                           <a:solidFill>
                             <a:srgbClr val="000000"/>
                           </a:solidFill>
                           <a:effectLst/>
-                          <a:uLnTx/>
-                          <a:uFillTx/>
                           <a:latin typeface="Century Gothic" panose="020B0502020202020204" pitchFamily="34" charset="0"/>
-                          <a:ea typeface="+mn-ea"/>
-                          <a:cs typeface="+mn-cs"/>
                         </a:rPr>
-                        <a:t>%</a:t>
+                        <a:t>8%</a:t>
                       </a:r>
-                      <a:endParaRPr kumimoji="0" lang="es-EC" sz="1200" b="0" i="0" u="none" strike="noStrike" kern="1200" cap="none" spc="0" normalizeH="0" baseline="0" noProof="0" dirty="0">
-                        <a:ln>
-                          <a:noFill/>
-                        </a:ln>
-                        <a:solidFill>
-                          <a:srgbClr val="000000"/>
-                        </a:solidFill>
-                        <a:effectLst/>
-                        <a:uLnTx/>
-                        <a:uFillTx/>
-                        <a:latin typeface="Century Gothic" panose="020B0502020202020204" pitchFamily="34" charset="0"/>
-                        <a:ea typeface="+mn-ea"/>
-                        <a:cs typeface="+mn-cs"/>
-                      </a:endParaRPr>
                     </a:p>
                   </a:txBody>
                   <a:tcPr marL="6350" marR="6350" marT="6350" marB="0" anchor="ctr">
@@ -19287,13 +19657,16 @@
                       <a:pPr algn="ctr" fontAlgn="b">
                         <a:buNone/>
                       </a:pPr>
-                      <a:endParaRPr lang="es-EC" sz="1200" b="0" i="0" u="none" strike="noStrike" dirty="0">
-                        <a:solidFill>
-                          <a:srgbClr val="000000"/>
-                        </a:solidFill>
-                        <a:effectLst/>
-                        <a:latin typeface="Century Gothic" panose="020B0502020202020204" pitchFamily="34" charset="0"/>
-                      </a:endParaRPr>
+                      <a:r>
+                        <a:rPr lang="es-EC" sz="1200" b="0" i="0" u="none" strike="noStrike" dirty="0">
+                          <a:solidFill>
+                            <a:srgbClr val="000000"/>
+                          </a:solidFill>
+                          <a:effectLst/>
+                          <a:latin typeface="Century Gothic" panose="020B0502020202020204" pitchFamily="34" charset="0"/>
+                        </a:rPr>
+                        <a:t>Gestión empresarial</a:t>
+                      </a:r>
                     </a:p>
                   </a:txBody>
                   <a:tcPr marL="6350" marR="6350" marT="6350" marB="0" anchor="ctr">
@@ -19351,54 +19724,19 @@
                     <a:bodyPr/>
                     <a:lstStyle/>
                     <a:p>
-                      <a:pPr marL="0" marR="0" lvl="0" indent="0" algn="ctr" defTabSz="914400" rtl="0" eaLnBrk="1" fontAlgn="b" latinLnBrk="0" hangingPunct="1">
-                        <a:lnSpc>
-                          <a:spcPct val="100000"/>
-                        </a:lnSpc>
-                        <a:spcBef>
-                          <a:spcPts val="0"/>
-                        </a:spcBef>
-                        <a:spcAft>
-                          <a:spcPts val="0"/>
-                        </a:spcAft>
-                        <a:buClrTx/>
-                        <a:buSzTx/>
-                        <a:buFontTx/>
+                      <a:pPr algn="ctr" fontAlgn="b">
                         <a:buNone/>
-                        <a:tabLst/>
-                        <a:defRPr/>
                       </a:pPr>
                       <a:r>
-                        <a:rPr kumimoji="0" lang="es-EC" sz="1200" b="0" i="0" u="none" strike="noStrike" kern="1200" cap="none" spc="0" normalizeH="0" baseline="0" noProof="0">
-                          <a:ln>
-                            <a:noFill/>
-                          </a:ln>
+                        <a:rPr lang="es-EC" sz="1200" b="0" i="0" u="none" strike="noStrike" dirty="0">
                           <a:solidFill>
                             <a:srgbClr val="000000"/>
                           </a:solidFill>
                           <a:effectLst/>
-                          <a:uLnTx/>
-                          <a:uFillTx/>
                           <a:latin typeface="Century Gothic" panose="020B0502020202020204" pitchFamily="34" charset="0"/>
-                          <a:ea typeface="+mn-ea"/>
-                          <a:cs typeface="+mn-cs"/>
                         </a:rPr>
-                        <a:t>%</a:t>
+                        <a:t>8%</a:t>
                       </a:r>
-                      <a:endParaRPr kumimoji="0" lang="es-EC" sz="1200" b="0" i="0" u="none" strike="noStrike" kern="1200" cap="none" spc="0" normalizeH="0" baseline="0" noProof="0" dirty="0">
-                        <a:ln>
-                          <a:noFill/>
-                        </a:ln>
-                        <a:solidFill>
-                          <a:srgbClr val="000000"/>
-                        </a:solidFill>
-                        <a:effectLst/>
-                        <a:uLnTx/>
-                        <a:uFillTx/>
-                        <a:latin typeface="Century Gothic" panose="020B0502020202020204" pitchFamily="34" charset="0"/>
-                        <a:ea typeface="+mn-ea"/>
-                        <a:cs typeface="+mn-cs"/>
-                      </a:endParaRPr>
                     </a:p>
                   </a:txBody>
                   <a:tcPr marL="6350" marR="6350" marT="6350" marB="0" anchor="ctr">
@@ -19524,13 +19862,16 @@
                       <a:pPr algn="ctr" fontAlgn="b">
                         <a:buNone/>
                       </a:pPr>
-                      <a:endParaRPr lang="es-EC" sz="1200" b="0" i="0" u="none" strike="noStrike">
-                        <a:solidFill>
-                          <a:srgbClr val="000000"/>
-                        </a:solidFill>
-                        <a:effectLst/>
-                        <a:latin typeface="Century Gothic" panose="020B0502020202020204" pitchFamily="34" charset="0"/>
-                      </a:endParaRPr>
+                      <a:r>
+                        <a:rPr lang="es-EC" sz="1200" b="0" i="0" u="none" strike="noStrike" dirty="0">
+                          <a:solidFill>
+                            <a:srgbClr val="000000"/>
+                          </a:solidFill>
+                          <a:effectLst/>
+                          <a:latin typeface="Century Gothic" panose="020B0502020202020204" pitchFamily="34" charset="0"/>
+                        </a:rPr>
+                        <a:t>Gestión empresarial</a:t>
+                      </a:r>
                     </a:p>
                   </a:txBody>
                   <a:tcPr marL="6350" marR="6350" marT="6350" marB="0" anchor="ctr">
@@ -19588,54 +19929,19 @@
                     <a:bodyPr/>
                     <a:lstStyle/>
                     <a:p>
-                      <a:pPr marL="0" marR="0" lvl="0" indent="0" algn="ctr" defTabSz="914400" rtl="0" eaLnBrk="1" fontAlgn="b" latinLnBrk="0" hangingPunct="1">
-                        <a:lnSpc>
-                          <a:spcPct val="100000"/>
-                        </a:lnSpc>
-                        <a:spcBef>
-                          <a:spcPts val="0"/>
-                        </a:spcBef>
-                        <a:spcAft>
-                          <a:spcPts val="0"/>
-                        </a:spcAft>
-                        <a:buClrTx/>
-                        <a:buSzTx/>
-                        <a:buFontTx/>
+                      <a:pPr algn="ctr" fontAlgn="b">
                         <a:buNone/>
-                        <a:tabLst/>
-                        <a:defRPr/>
                       </a:pPr>
                       <a:r>
-                        <a:rPr kumimoji="0" lang="es-EC" sz="1200" b="0" i="0" u="none" strike="noStrike" kern="1200" cap="none" spc="0" normalizeH="0" baseline="0" noProof="0">
-                          <a:ln>
-                            <a:noFill/>
-                          </a:ln>
+                        <a:rPr lang="es-EC" sz="1200" b="0" i="0" u="none" strike="noStrike" dirty="0">
                           <a:solidFill>
                             <a:srgbClr val="000000"/>
                           </a:solidFill>
                           <a:effectLst/>
-                          <a:uLnTx/>
-                          <a:uFillTx/>
                           <a:latin typeface="Century Gothic" panose="020B0502020202020204" pitchFamily="34" charset="0"/>
-                          <a:ea typeface="+mn-ea"/>
-                          <a:cs typeface="+mn-cs"/>
                         </a:rPr>
-                        <a:t>%</a:t>
+                        <a:t>8%</a:t>
                       </a:r>
-                      <a:endParaRPr kumimoji="0" lang="es-EC" sz="1200" b="0" i="0" u="none" strike="noStrike" kern="1200" cap="none" spc="0" normalizeH="0" baseline="0" noProof="0" dirty="0">
-                        <a:ln>
-                          <a:noFill/>
-                        </a:ln>
-                        <a:solidFill>
-                          <a:srgbClr val="000000"/>
-                        </a:solidFill>
-                        <a:effectLst/>
-                        <a:uLnTx/>
-                        <a:uFillTx/>
-                        <a:latin typeface="Century Gothic" panose="020B0502020202020204" pitchFamily="34" charset="0"/>
-                        <a:ea typeface="+mn-ea"/>
-                        <a:cs typeface="+mn-cs"/>
-                      </a:endParaRPr>
                     </a:p>
                   </a:txBody>
                   <a:tcPr marL="6350" marR="6350" marT="6350" marB="0" anchor="ctr">
@@ -19703,13 +20009,16 @@
                       <a:pPr algn="ctr" fontAlgn="b">
                         <a:buNone/>
                       </a:pPr>
-                      <a:endParaRPr lang="es-EC" sz="1200" b="0" i="0" u="none" strike="noStrike" dirty="0">
-                        <a:solidFill>
-                          <a:srgbClr val="000000"/>
-                        </a:solidFill>
-                        <a:effectLst/>
-                        <a:latin typeface="Century Gothic" panose="020B0502020202020204" pitchFamily="34" charset="0"/>
-                      </a:endParaRPr>
+                      <a:r>
+                        <a:rPr lang="es-EC" sz="1200" b="0" i="0" u="none" strike="noStrike" dirty="0">
+                          <a:solidFill>
+                            <a:srgbClr val="000000"/>
+                          </a:solidFill>
+                          <a:effectLst/>
+                          <a:latin typeface="Century Gothic" panose="020B0502020202020204" pitchFamily="34" charset="0"/>
+                        </a:rPr>
+                        <a:t>Gestión empresarial</a:t>
+                      </a:r>
                     </a:p>
                   </a:txBody>
                   <a:tcPr marL="6350" marR="6350" marT="6350" marB="0" anchor="ctr">
@@ -19767,54 +20076,19 @@
                     <a:bodyPr/>
                     <a:lstStyle/>
                     <a:p>
-                      <a:pPr marL="0" marR="0" lvl="0" indent="0" algn="ctr" defTabSz="914400" rtl="0" eaLnBrk="1" fontAlgn="b" latinLnBrk="0" hangingPunct="1">
-                        <a:lnSpc>
-                          <a:spcPct val="100000"/>
-                        </a:lnSpc>
-                        <a:spcBef>
-                          <a:spcPts val="0"/>
-                        </a:spcBef>
-                        <a:spcAft>
-                          <a:spcPts val="0"/>
-                        </a:spcAft>
-                        <a:buClrTx/>
-                        <a:buSzTx/>
-                        <a:buFontTx/>
+                      <a:pPr algn="ctr" fontAlgn="b">
                         <a:buNone/>
-                        <a:tabLst/>
-                        <a:defRPr/>
                       </a:pPr>
                       <a:r>
-                        <a:rPr kumimoji="0" lang="es-EC" sz="1200" b="0" i="0" u="none" strike="noStrike" kern="1200" cap="none" spc="0" normalizeH="0" baseline="0" noProof="0">
-                          <a:ln>
-                            <a:noFill/>
-                          </a:ln>
+                        <a:rPr lang="es-EC" sz="1200" b="0" i="0" u="none" strike="noStrike" dirty="0">
                           <a:solidFill>
                             <a:srgbClr val="000000"/>
                           </a:solidFill>
                           <a:effectLst/>
-                          <a:uLnTx/>
-                          <a:uFillTx/>
                           <a:latin typeface="Century Gothic" panose="020B0502020202020204" pitchFamily="34" charset="0"/>
-                          <a:ea typeface="+mn-ea"/>
-                          <a:cs typeface="+mn-cs"/>
                         </a:rPr>
-                        <a:t>%</a:t>
+                        <a:t>8%</a:t>
                       </a:r>
-                      <a:endParaRPr kumimoji="0" lang="es-EC" sz="1200" b="0" i="0" u="none" strike="noStrike" kern="1200" cap="none" spc="0" normalizeH="0" baseline="0" noProof="0" dirty="0">
-                        <a:ln>
-                          <a:noFill/>
-                        </a:ln>
-                        <a:solidFill>
-                          <a:srgbClr val="000000"/>
-                        </a:solidFill>
-                        <a:effectLst/>
-                        <a:uLnTx/>
-                        <a:uFillTx/>
-                        <a:latin typeface="Century Gothic" panose="020B0502020202020204" pitchFamily="34" charset="0"/>
-                        <a:ea typeface="+mn-ea"/>
-                        <a:cs typeface="+mn-cs"/>
-                      </a:endParaRPr>
                     </a:p>
                   </a:txBody>
                   <a:tcPr marL="6350" marR="6350" marT="6350" marB="0" anchor="ctr">
@@ -19940,13 +20214,16 @@
                       <a:pPr algn="ctr" fontAlgn="b">
                         <a:buNone/>
                       </a:pPr>
-                      <a:endParaRPr lang="es-EC" sz="1200" b="0" i="0" u="none" strike="noStrike">
-                        <a:solidFill>
-                          <a:srgbClr val="000000"/>
-                        </a:solidFill>
-                        <a:effectLst/>
-                        <a:latin typeface="Century Gothic" panose="020B0502020202020204" pitchFamily="34" charset="0"/>
-                      </a:endParaRPr>
+                      <a:r>
+                        <a:rPr lang="es-EC" sz="1200" b="0" i="0" u="none" strike="noStrike" dirty="0">
+                          <a:solidFill>
+                            <a:srgbClr val="000000"/>
+                          </a:solidFill>
+                          <a:effectLst/>
+                          <a:latin typeface="Century Gothic" panose="020B0502020202020204" pitchFamily="34" charset="0"/>
+                        </a:rPr>
+                        <a:t>Gestión empresarial</a:t>
+                      </a:r>
                     </a:p>
                   </a:txBody>
                   <a:tcPr marL="6350" marR="6350" marT="6350" marB="0" anchor="ctr">
@@ -20004,54 +20281,19 @@
                     <a:bodyPr/>
                     <a:lstStyle/>
                     <a:p>
-                      <a:pPr marL="0" marR="0" lvl="0" indent="0" algn="ctr" defTabSz="914400" rtl="0" eaLnBrk="1" fontAlgn="b" latinLnBrk="0" hangingPunct="1">
-                        <a:lnSpc>
-                          <a:spcPct val="100000"/>
-                        </a:lnSpc>
-                        <a:spcBef>
-                          <a:spcPts val="0"/>
-                        </a:spcBef>
-                        <a:spcAft>
-                          <a:spcPts val="0"/>
-                        </a:spcAft>
-                        <a:buClrTx/>
-                        <a:buSzTx/>
-                        <a:buFontTx/>
+                      <a:pPr algn="ctr" fontAlgn="b">
                         <a:buNone/>
-                        <a:tabLst/>
-                        <a:defRPr/>
                       </a:pPr>
                       <a:r>
-                        <a:rPr kumimoji="0" lang="es-EC" sz="1200" b="0" i="0" u="none" strike="noStrike" kern="1200" cap="none" spc="0" normalizeH="0" baseline="0" noProof="0">
-                          <a:ln>
-                            <a:noFill/>
-                          </a:ln>
+                        <a:rPr lang="es-EC" sz="1200" b="0" i="0" u="none" strike="noStrike" dirty="0">
                           <a:solidFill>
                             <a:srgbClr val="000000"/>
                           </a:solidFill>
                           <a:effectLst/>
-                          <a:uLnTx/>
-                          <a:uFillTx/>
                           <a:latin typeface="Century Gothic" panose="020B0502020202020204" pitchFamily="34" charset="0"/>
-                          <a:ea typeface="+mn-ea"/>
-                          <a:cs typeface="+mn-cs"/>
                         </a:rPr>
-                        <a:t>%</a:t>
+                        <a:t>8%</a:t>
                       </a:r>
-                      <a:endParaRPr kumimoji="0" lang="es-EC" sz="1200" b="0" i="0" u="none" strike="noStrike" kern="1200" cap="none" spc="0" normalizeH="0" baseline="0" noProof="0" dirty="0">
-                        <a:ln>
-                          <a:noFill/>
-                        </a:ln>
-                        <a:solidFill>
-                          <a:srgbClr val="000000"/>
-                        </a:solidFill>
-                        <a:effectLst/>
-                        <a:uLnTx/>
-                        <a:uFillTx/>
-                        <a:latin typeface="Century Gothic" panose="020B0502020202020204" pitchFamily="34" charset="0"/>
-                        <a:ea typeface="+mn-ea"/>
-                        <a:cs typeface="+mn-cs"/>
-                      </a:endParaRPr>
                     </a:p>
                   </a:txBody>
                   <a:tcPr marL="6350" marR="6350" marT="6350" marB="0" anchor="ctr">
@@ -20119,13 +20361,16 @@
                       <a:pPr algn="ctr" fontAlgn="b">
                         <a:buNone/>
                       </a:pPr>
-                      <a:endParaRPr lang="es-EC" sz="1200" b="0" i="0" u="none" strike="noStrike" dirty="0">
-                        <a:solidFill>
-                          <a:srgbClr val="000000"/>
-                        </a:solidFill>
-                        <a:effectLst/>
-                        <a:latin typeface="Century Gothic" panose="020B0502020202020204" pitchFamily="34" charset="0"/>
-                      </a:endParaRPr>
+                      <a:r>
+                        <a:rPr lang="es-EC" sz="1200" b="0" i="0" u="none" strike="noStrike" dirty="0">
+                          <a:solidFill>
+                            <a:srgbClr val="000000"/>
+                          </a:solidFill>
+                          <a:effectLst/>
+                          <a:latin typeface="Century Gothic" panose="020B0502020202020204" pitchFamily="34" charset="0"/>
+                        </a:rPr>
+                        <a:t>Gestión empresarial</a:t>
+                      </a:r>
                     </a:p>
                   </a:txBody>
                   <a:tcPr marL="6350" marR="6350" marT="6350" marB="0" anchor="ctr">
@@ -20183,54 +20428,19 @@
                     <a:bodyPr/>
                     <a:lstStyle/>
                     <a:p>
-                      <a:pPr marL="0" marR="0" lvl="0" indent="0" algn="ctr" defTabSz="914400" rtl="0" eaLnBrk="1" fontAlgn="b" latinLnBrk="0" hangingPunct="1">
-                        <a:lnSpc>
-                          <a:spcPct val="100000"/>
-                        </a:lnSpc>
-                        <a:spcBef>
-                          <a:spcPts val="0"/>
-                        </a:spcBef>
-                        <a:spcAft>
-                          <a:spcPts val="0"/>
-                        </a:spcAft>
-                        <a:buClrTx/>
-                        <a:buSzTx/>
-                        <a:buFontTx/>
+                      <a:pPr algn="ctr" fontAlgn="b">
                         <a:buNone/>
-                        <a:tabLst/>
-                        <a:defRPr/>
                       </a:pPr>
                       <a:r>
-                        <a:rPr kumimoji="0" lang="es-EC" sz="1200" b="0" i="0" u="none" strike="noStrike" kern="1200" cap="none" spc="0" normalizeH="0" baseline="0" noProof="0">
-                          <a:ln>
-                            <a:noFill/>
-                          </a:ln>
+                        <a:rPr lang="es-EC" sz="1200" b="0" i="0" u="none" strike="noStrike" dirty="0">
                           <a:solidFill>
                             <a:srgbClr val="000000"/>
                           </a:solidFill>
                           <a:effectLst/>
-                          <a:uLnTx/>
-                          <a:uFillTx/>
                           <a:latin typeface="Century Gothic" panose="020B0502020202020204" pitchFamily="34" charset="0"/>
-                          <a:ea typeface="+mn-ea"/>
-                          <a:cs typeface="+mn-cs"/>
                         </a:rPr>
-                        <a:t>%</a:t>
+                        <a:t>8%</a:t>
                       </a:r>
-                      <a:endParaRPr kumimoji="0" lang="es-EC" sz="1200" b="0" i="0" u="none" strike="noStrike" kern="1200" cap="none" spc="0" normalizeH="0" baseline="0" noProof="0" dirty="0">
-                        <a:ln>
-                          <a:noFill/>
-                        </a:ln>
-                        <a:solidFill>
-                          <a:srgbClr val="000000"/>
-                        </a:solidFill>
-                        <a:effectLst/>
-                        <a:uLnTx/>
-                        <a:uFillTx/>
-                        <a:latin typeface="Century Gothic" panose="020B0502020202020204" pitchFamily="34" charset="0"/>
-                        <a:ea typeface="+mn-ea"/>
-                        <a:cs typeface="+mn-cs"/>
-                      </a:endParaRPr>
                     </a:p>
                   </a:txBody>
                   <a:tcPr marL="6350" marR="6350" marT="6350" marB="0" anchor="ctr">
@@ -20356,13 +20566,16 @@
                       <a:pPr algn="ctr" fontAlgn="b">
                         <a:buNone/>
                       </a:pPr>
-                      <a:endParaRPr lang="es-EC" sz="1200" b="0" i="0" u="none" strike="noStrike" dirty="0">
-                        <a:solidFill>
-                          <a:srgbClr val="000000"/>
-                        </a:solidFill>
-                        <a:effectLst/>
-                        <a:latin typeface="Century Gothic" panose="020B0502020202020204" pitchFamily="34" charset="0"/>
-                      </a:endParaRPr>
+                      <a:r>
+                        <a:rPr lang="es-EC" sz="1200" b="0" i="0" u="none" strike="noStrike" dirty="0">
+                          <a:solidFill>
+                            <a:srgbClr val="000000"/>
+                          </a:solidFill>
+                          <a:effectLst/>
+                          <a:latin typeface="Century Gothic" panose="020B0502020202020204" pitchFamily="34" charset="0"/>
+                        </a:rPr>
+                        <a:t>Gestión empresarial</a:t>
+                      </a:r>
                     </a:p>
                   </a:txBody>
                   <a:tcPr marL="6350" marR="6350" marT="6350" marB="0" anchor="ctr">
@@ -20420,54 +20633,19 @@
                     <a:bodyPr/>
                     <a:lstStyle/>
                     <a:p>
-                      <a:pPr marL="0" marR="0" lvl="0" indent="0" algn="ctr" defTabSz="914400" rtl="0" eaLnBrk="1" fontAlgn="b" latinLnBrk="0" hangingPunct="1">
-                        <a:lnSpc>
-                          <a:spcPct val="100000"/>
-                        </a:lnSpc>
-                        <a:spcBef>
-                          <a:spcPts val="0"/>
-                        </a:spcBef>
-                        <a:spcAft>
-                          <a:spcPts val="0"/>
-                        </a:spcAft>
-                        <a:buClrTx/>
-                        <a:buSzTx/>
-                        <a:buFontTx/>
+                      <a:pPr algn="ctr" fontAlgn="b">
                         <a:buNone/>
-                        <a:tabLst/>
-                        <a:defRPr/>
                       </a:pPr>
                       <a:r>
-                        <a:rPr kumimoji="0" lang="es-EC" sz="1200" b="0" i="0" u="none" strike="noStrike" kern="1200" cap="none" spc="0" normalizeH="0" baseline="0" noProof="0">
-                          <a:ln>
-                            <a:noFill/>
-                          </a:ln>
+                        <a:rPr lang="es-EC" sz="1200" b="0" i="0" u="none" strike="noStrike" dirty="0">
                           <a:solidFill>
                             <a:srgbClr val="000000"/>
                           </a:solidFill>
                           <a:effectLst/>
-                          <a:uLnTx/>
-                          <a:uFillTx/>
                           <a:latin typeface="Century Gothic" panose="020B0502020202020204" pitchFamily="34" charset="0"/>
-                          <a:ea typeface="+mn-ea"/>
-                          <a:cs typeface="+mn-cs"/>
                         </a:rPr>
-                        <a:t>%</a:t>
+                        <a:t>8%</a:t>
                       </a:r>
-                      <a:endParaRPr kumimoji="0" lang="es-EC" sz="1200" b="0" i="0" u="none" strike="noStrike" kern="1200" cap="none" spc="0" normalizeH="0" baseline="0" noProof="0" dirty="0">
-                        <a:ln>
-                          <a:noFill/>
-                        </a:ln>
-                        <a:solidFill>
-                          <a:srgbClr val="000000"/>
-                        </a:solidFill>
-                        <a:effectLst/>
-                        <a:uLnTx/>
-                        <a:uFillTx/>
-                        <a:latin typeface="Century Gothic" panose="020B0502020202020204" pitchFamily="34" charset="0"/>
-                        <a:ea typeface="+mn-ea"/>
-                        <a:cs typeface="+mn-cs"/>
-                      </a:endParaRPr>
                     </a:p>
                   </a:txBody>
                   <a:tcPr marL="6350" marR="6350" marT="6350" marB="0" anchor="ctr">
@@ -20535,13 +20713,16 @@
                       <a:pPr algn="ctr" fontAlgn="b">
                         <a:buNone/>
                       </a:pPr>
-                      <a:endParaRPr lang="es-EC" sz="1200" b="0" i="0" u="none" strike="noStrike">
-                        <a:solidFill>
-                          <a:srgbClr val="000000"/>
-                        </a:solidFill>
-                        <a:effectLst/>
-                        <a:latin typeface="Century Gothic" panose="020B0502020202020204" pitchFamily="34" charset="0"/>
-                      </a:endParaRPr>
+                      <a:r>
+                        <a:rPr lang="es-EC" sz="1200" b="0" i="0" u="none" strike="noStrike" dirty="0">
+                          <a:solidFill>
+                            <a:srgbClr val="000000"/>
+                          </a:solidFill>
+                          <a:effectLst/>
+                          <a:latin typeface="Century Gothic" panose="020B0502020202020204" pitchFamily="34" charset="0"/>
+                        </a:rPr>
+                        <a:t>Gestión empresarial</a:t>
+                      </a:r>
                     </a:p>
                   </a:txBody>
                   <a:tcPr marL="6350" marR="6350" marT="6350" marB="0" anchor="ctr">
@@ -20599,54 +20780,19 @@
                     <a:bodyPr/>
                     <a:lstStyle/>
                     <a:p>
-                      <a:pPr marL="0" marR="0" lvl="0" indent="0" algn="ctr" defTabSz="914400" rtl="0" eaLnBrk="1" fontAlgn="b" latinLnBrk="0" hangingPunct="1">
-                        <a:lnSpc>
-                          <a:spcPct val="100000"/>
-                        </a:lnSpc>
-                        <a:spcBef>
-                          <a:spcPts val="0"/>
-                        </a:spcBef>
-                        <a:spcAft>
-                          <a:spcPts val="0"/>
-                        </a:spcAft>
-                        <a:buClrTx/>
-                        <a:buSzTx/>
-                        <a:buFontTx/>
+                      <a:pPr algn="ctr" fontAlgn="b">
                         <a:buNone/>
-                        <a:tabLst/>
-                        <a:defRPr/>
                       </a:pPr>
                       <a:r>
-                        <a:rPr kumimoji="0" lang="es-EC" sz="1200" b="0" i="0" u="none" strike="noStrike" kern="1200" cap="none" spc="0" normalizeH="0" baseline="0" noProof="0">
-                          <a:ln>
-                            <a:noFill/>
-                          </a:ln>
+                        <a:rPr lang="es-EC" sz="1200" b="0" i="0" u="none" strike="noStrike" dirty="0">
                           <a:solidFill>
                             <a:srgbClr val="000000"/>
                           </a:solidFill>
                           <a:effectLst/>
-                          <a:uLnTx/>
-                          <a:uFillTx/>
                           <a:latin typeface="Century Gothic" panose="020B0502020202020204" pitchFamily="34" charset="0"/>
-                          <a:ea typeface="+mn-ea"/>
-                          <a:cs typeface="+mn-cs"/>
                         </a:rPr>
-                        <a:t>%</a:t>
+                        <a:t>8%</a:t>
                       </a:r>
-                      <a:endParaRPr kumimoji="0" lang="es-EC" sz="1200" b="0" i="0" u="none" strike="noStrike" kern="1200" cap="none" spc="0" normalizeH="0" baseline="0" noProof="0" dirty="0">
-                        <a:ln>
-                          <a:noFill/>
-                        </a:ln>
-                        <a:solidFill>
-                          <a:srgbClr val="000000"/>
-                        </a:solidFill>
-                        <a:effectLst/>
-                        <a:uLnTx/>
-                        <a:uFillTx/>
-                        <a:latin typeface="Century Gothic" panose="020B0502020202020204" pitchFamily="34" charset="0"/>
-                        <a:ea typeface="+mn-ea"/>
-                        <a:cs typeface="+mn-cs"/>
-                      </a:endParaRPr>
                     </a:p>
                   </a:txBody>
                   <a:tcPr marL="6350" marR="6350" marT="6350" marB="0" anchor="ctr">
@@ -20772,13 +20918,16 @@
                       <a:pPr algn="ctr" fontAlgn="b">
                         <a:buNone/>
                       </a:pPr>
-                      <a:endParaRPr lang="es-MX" sz="1200" b="0" i="0" u="none" strike="noStrike">
-                        <a:solidFill>
-                          <a:srgbClr val="000000"/>
-                        </a:solidFill>
-                        <a:effectLst/>
-                        <a:latin typeface="Century Gothic" panose="020B0502020202020204" pitchFamily="34" charset="0"/>
-                      </a:endParaRPr>
+                      <a:r>
+                        <a:rPr lang="es-EC" sz="1200" b="0" i="0" u="none" strike="noStrike" dirty="0">
+                          <a:solidFill>
+                            <a:srgbClr val="000000"/>
+                          </a:solidFill>
+                          <a:effectLst/>
+                          <a:latin typeface="Century Gothic" panose="020B0502020202020204" pitchFamily="34" charset="0"/>
+                        </a:rPr>
+                        <a:t>Gestión empresarial</a:t>
+                      </a:r>
                     </a:p>
                   </a:txBody>
                   <a:tcPr marL="6350" marR="6350" marT="6350" marB="0" anchor="ctr">
@@ -20836,54 +20985,19 @@
                     <a:bodyPr/>
                     <a:lstStyle/>
                     <a:p>
-                      <a:pPr marL="0" marR="0" lvl="0" indent="0" algn="ctr" defTabSz="914400" rtl="0" eaLnBrk="1" fontAlgn="b" latinLnBrk="0" hangingPunct="1">
-                        <a:lnSpc>
-                          <a:spcPct val="100000"/>
-                        </a:lnSpc>
-                        <a:spcBef>
-                          <a:spcPts val="0"/>
-                        </a:spcBef>
-                        <a:spcAft>
-                          <a:spcPts val="0"/>
-                        </a:spcAft>
-                        <a:buClrTx/>
-                        <a:buSzTx/>
-                        <a:buFontTx/>
+                      <a:pPr algn="ctr" fontAlgn="b">
                         <a:buNone/>
-                        <a:tabLst/>
-                        <a:defRPr/>
                       </a:pPr>
                       <a:r>
-                        <a:rPr kumimoji="0" lang="es-EC" sz="1200" b="0" i="0" u="none" strike="noStrike" kern="1200" cap="none" spc="0" normalizeH="0" baseline="0" noProof="0">
-                          <a:ln>
-                            <a:noFill/>
-                          </a:ln>
+                        <a:rPr lang="es-EC" sz="1200" b="0" i="0" u="none" strike="noStrike" dirty="0">
                           <a:solidFill>
                             <a:srgbClr val="000000"/>
                           </a:solidFill>
                           <a:effectLst/>
-                          <a:uLnTx/>
-                          <a:uFillTx/>
                           <a:latin typeface="Century Gothic" panose="020B0502020202020204" pitchFamily="34" charset="0"/>
-                          <a:ea typeface="+mn-ea"/>
-                          <a:cs typeface="+mn-cs"/>
                         </a:rPr>
-                        <a:t>%</a:t>
+                        <a:t>8%</a:t>
                       </a:r>
-                      <a:endParaRPr kumimoji="0" lang="es-EC" sz="1200" b="0" i="0" u="none" strike="noStrike" kern="1200" cap="none" spc="0" normalizeH="0" baseline="0" noProof="0" dirty="0">
-                        <a:ln>
-                          <a:noFill/>
-                        </a:ln>
-                        <a:solidFill>
-                          <a:srgbClr val="000000"/>
-                        </a:solidFill>
-                        <a:effectLst/>
-                        <a:uLnTx/>
-                        <a:uFillTx/>
-                        <a:latin typeface="Century Gothic" panose="020B0502020202020204" pitchFamily="34" charset="0"/>
-                        <a:ea typeface="+mn-ea"/>
-                        <a:cs typeface="+mn-cs"/>
-                      </a:endParaRPr>
                     </a:p>
                   </a:txBody>
                   <a:tcPr marL="6350" marR="6350" marT="6350" marB="0" anchor="ctr">
@@ -20951,13 +21065,16 @@
                       <a:pPr algn="ctr" fontAlgn="b">
                         <a:buNone/>
                       </a:pPr>
-                      <a:endParaRPr lang="es-EC" sz="1200" b="0" i="0" u="none" strike="noStrike" dirty="0">
-                        <a:solidFill>
-                          <a:srgbClr val="000000"/>
-                        </a:solidFill>
-                        <a:effectLst/>
-                        <a:latin typeface="Century Gothic" panose="020B0502020202020204" pitchFamily="34" charset="0"/>
-                      </a:endParaRPr>
+                      <a:r>
+                        <a:rPr lang="es-EC" sz="1200" b="0" i="0" u="none" strike="noStrike" dirty="0">
+                          <a:solidFill>
+                            <a:srgbClr val="000000"/>
+                          </a:solidFill>
+                          <a:effectLst/>
+                          <a:latin typeface="Century Gothic" panose="020B0502020202020204" pitchFamily="34" charset="0"/>
+                        </a:rPr>
+                        <a:t>Gestión empresarial</a:t>
+                      </a:r>
                     </a:p>
                   </a:txBody>
                   <a:tcPr marL="6350" marR="6350" marT="6350" marB="0" anchor="ctr">
@@ -21015,54 +21132,19 @@
                     <a:bodyPr/>
                     <a:lstStyle/>
                     <a:p>
-                      <a:pPr marL="0" marR="0" lvl="0" indent="0" algn="ctr" defTabSz="914400" rtl="0" eaLnBrk="1" fontAlgn="b" latinLnBrk="0" hangingPunct="1">
-                        <a:lnSpc>
-                          <a:spcPct val="100000"/>
-                        </a:lnSpc>
-                        <a:spcBef>
-                          <a:spcPts val="0"/>
-                        </a:spcBef>
-                        <a:spcAft>
-                          <a:spcPts val="0"/>
-                        </a:spcAft>
-                        <a:buClrTx/>
-                        <a:buSzTx/>
-                        <a:buFontTx/>
+                      <a:pPr algn="ctr" fontAlgn="b">
                         <a:buNone/>
-                        <a:tabLst/>
-                        <a:defRPr/>
                       </a:pPr>
                       <a:r>
-                        <a:rPr kumimoji="0" lang="es-EC" sz="1200" b="0" i="0" u="none" strike="noStrike" kern="1200" cap="none" spc="0" normalizeH="0" baseline="0" noProof="0">
-                          <a:ln>
-                            <a:noFill/>
-                          </a:ln>
+                        <a:rPr lang="es-EC" sz="1200" b="0" i="0" u="none" strike="noStrike" dirty="0">
                           <a:solidFill>
                             <a:srgbClr val="000000"/>
                           </a:solidFill>
                           <a:effectLst/>
-                          <a:uLnTx/>
-                          <a:uFillTx/>
                           <a:latin typeface="Century Gothic" panose="020B0502020202020204" pitchFamily="34" charset="0"/>
-                          <a:ea typeface="+mn-ea"/>
-                          <a:cs typeface="+mn-cs"/>
                         </a:rPr>
-                        <a:t>%</a:t>
+                        <a:t>8%</a:t>
                       </a:r>
-                      <a:endParaRPr kumimoji="0" lang="es-EC" sz="1200" b="0" i="0" u="none" strike="noStrike" kern="1200" cap="none" spc="0" normalizeH="0" baseline="0" noProof="0" dirty="0">
-                        <a:ln>
-                          <a:noFill/>
-                        </a:ln>
-                        <a:solidFill>
-                          <a:srgbClr val="000000"/>
-                        </a:solidFill>
-                        <a:effectLst/>
-                        <a:uLnTx/>
-                        <a:uFillTx/>
-                        <a:latin typeface="Century Gothic" panose="020B0502020202020204" pitchFamily="34" charset="0"/>
-                        <a:ea typeface="+mn-ea"/>
-                        <a:cs typeface="+mn-cs"/>
-                      </a:endParaRPr>
                     </a:p>
                   </a:txBody>
                   <a:tcPr marL="6350" marR="6350" marT="6350" marB="0" anchor="ctr">
@@ -21188,13 +21270,16 @@
                       <a:pPr algn="ctr" fontAlgn="b">
                         <a:buNone/>
                       </a:pPr>
-                      <a:endParaRPr lang="es-EC" sz="1200" b="0" i="0" u="none" strike="noStrike" dirty="0">
-                        <a:solidFill>
-                          <a:srgbClr val="000000"/>
-                        </a:solidFill>
-                        <a:effectLst/>
-                        <a:latin typeface="Century Gothic" panose="020B0502020202020204" pitchFamily="34" charset="0"/>
-                      </a:endParaRPr>
+                      <a:r>
+                        <a:rPr lang="es-EC" sz="1200" b="0" i="0" u="none" strike="noStrike" dirty="0">
+                          <a:solidFill>
+                            <a:srgbClr val="000000"/>
+                          </a:solidFill>
+                          <a:effectLst/>
+                          <a:latin typeface="Century Gothic" panose="020B0502020202020204" pitchFamily="34" charset="0"/>
+                        </a:rPr>
+                        <a:t>Gestión empresarial</a:t>
+                      </a:r>
                     </a:p>
                   </a:txBody>
                   <a:tcPr marL="6350" marR="6350" marT="6350" marB="0" anchor="ctr">
@@ -21252,54 +21337,19 @@
                     <a:bodyPr/>
                     <a:lstStyle/>
                     <a:p>
-                      <a:pPr marL="0" marR="0" lvl="0" indent="0" algn="ctr" defTabSz="914400" rtl="0" eaLnBrk="1" fontAlgn="b" latinLnBrk="0" hangingPunct="1">
-                        <a:lnSpc>
-                          <a:spcPct val="100000"/>
-                        </a:lnSpc>
-                        <a:spcBef>
-                          <a:spcPts val="0"/>
-                        </a:spcBef>
-                        <a:spcAft>
-                          <a:spcPts val="0"/>
-                        </a:spcAft>
-                        <a:buClrTx/>
-                        <a:buSzTx/>
-                        <a:buFontTx/>
+                      <a:pPr algn="ctr" fontAlgn="b">
                         <a:buNone/>
-                        <a:tabLst/>
-                        <a:defRPr/>
                       </a:pPr>
                       <a:r>
-                        <a:rPr kumimoji="0" lang="es-EC" sz="1200" b="0" i="0" u="none" strike="noStrike" kern="1200" cap="none" spc="0" normalizeH="0" baseline="0" noProof="0">
-                          <a:ln>
-                            <a:noFill/>
-                          </a:ln>
+                        <a:rPr lang="es-EC" sz="1200" b="0" i="0" u="none" strike="noStrike" dirty="0">
                           <a:solidFill>
                             <a:srgbClr val="000000"/>
                           </a:solidFill>
                           <a:effectLst/>
-                          <a:uLnTx/>
-                          <a:uFillTx/>
                           <a:latin typeface="Century Gothic" panose="020B0502020202020204" pitchFamily="34" charset="0"/>
-                          <a:ea typeface="+mn-ea"/>
-                          <a:cs typeface="+mn-cs"/>
                         </a:rPr>
-                        <a:t>%</a:t>
+                        <a:t>8%</a:t>
                       </a:r>
-                      <a:endParaRPr kumimoji="0" lang="es-EC" sz="1200" b="0" i="0" u="none" strike="noStrike" kern="1200" cap="none" spc="0" normalizeH="0" baseline="0" noProof="0" dirty="0">
-                        <a:ln>
-                          <a:noFill/>
-                        </a:ln>
-                        <a:solidFill>
-                          <a:srgbClr val="000000"/>
-                        </a:solidFill>
-                        <a:effectLst/>
-                        <a:uLnTx/>
-                        <a:uFillTx/>
-                        <a:latin typeface="Century Gothic" panose="020B0502020202020204" pitchFamily="34" charset="0"/>
-                        <a:ea typeface="+mn-ea"/>
-                        <a:cs typeface="+mn-cs"/>
-                      </a:endParaRPr>
                     </a:p>
                   </a:txBody>
                   <a:tcPr marL="6350" marR="6350" marT="6350" marB="0" anchor="ctr">
@@ -21367,13 +21417,16 @@
                       <a:pPr algn="ctr" fontAlgn="b">
                         <a:buNone/>
                       </a:pPr>
-                      <a:endParaRPr lang="es-EC" sz="1200" b="0" i="0" u="none" strike="noStrike">
-                        <a:solidFill>
-                          <a:srgbClr val="000000"/>
-                        </a:solidFill>
-                        <a:effectLst/>
-                        <a:latin typeface="Century Gothic" panose="020B0502020202020204" pitchFamily="34" charset="0"/>
-                      </a:endParaRPr>
+                      <a:r>
+                        <a:rPr lang="es-EC" sz="1200" b="0" i="0" u="none" strike="noStrike" dirty="0">
+                          <a:solidFill>
+                            <a:srgbClr val="000000"/>
+                          </a:solidFill>
+                          <a:effectLst/>
+                          <a:latin typeface="Century Gothic" panose="020B0502020202020204" pitchFamily="34" charset="0"/>
+                        </a:rPr>
+                        <a:t>Gestión empresarial</a:t>
+                      </a:r>
                     </a:p>
                   </a:txBody>
                   <a:tcPr marL="6350" marR="6350" marT="6350" marB="0" anchor="ctr">
@@ -21431,54 +21484,19 @@
                     <a:bodyPr/>
                     <a:lstStyle/>
                     <a:p>
-                      <a:pPr marL="0" marR="0" lvl="0" indent="0" algn="ctr" defTabSz="914400" rtl="0" eaLnBrk="1" fontAlgn="b" latinLnBrk="0" hangingPunct="1">
-                        <a:lnSpc>
-                          <a:spcPct val="100000"/>
-                        </a:lnSpc>
-                        <a:spcBef>
-                          <a:spcPts val="0"/>
-                        </a:spcBef>
-                        <a:spcAft>
-                          <a:spcPts val="0"/>
-                        </a:spcAft>
-                        <a:buClrTx/>
-                        <a:buSzTx/>
-                        <a:buFontTx/>
+                      <a:pPr algn="ctr" fontAlgn="b">
                         <a:buNone/>
-                        <a:tabLst/>
-                        <a:defRPr/>
                       </a:pPr>
                       <a:r>
-                        <a:rPr kumimoji="0" lang="es-EC" sz="1200" b="0" i="0" u="none" strike="noStrike" kern="1200" cap="none" spc="0" normalizeH="0" baseline="0" noProof="0">
-                          <a:ln>
-                            <a:noFill/>
-                          </a:ln>
+                        <a:rPr lang="es-EC" sz="1200" b="0" i="0" u="none" strike="noStrike" dirty="0">
                           <a:solidFill>
                             <a:srgbClr val="000000"/>
                           </a:solidFill>
                           <a:effectLst/>
-                          <a:uLnTx/>
-                          <a:uFillTx/>
                           <a:latin typeface="Century Gothic" panose="020B0502020202020204" pitchFamily="34" charset="0"/>
-                          <a:ea typeface="+mn-ea"/>
-                          <a:cs typeface="+mn-cs"/>
                         </a:rPr>
-                        <a:t>%</a:t>
+                        <a:t>8%</a:t>
                       </a:r>
-                      <a:endParaRPr kumimoji="0" lang="es-EC" sz="1200" b="0" i="0" u="none" strike="noStrike" kern="1200" cap="none" spc="0" normalizeH="0" baseline="0" noProof="0" dirty="0">
-                        <a:ln>
-                          <a:noFill/>
-                        </a:ln>
-                        <a:solidFill>
-                          <a:srgbClr val="000000"/>
-                        </a:solidFill>
-                        <a:effectLst/>
-                        <a:uLnTx/>
-                        <a:uFillTx/>
-                        <a:latin typeface="Century Gothic" panose="020B0502020202020204" pitchFamily="34" charset="0"/>
-                        <a:ea typeface="+mn-ea"/>
-                        <a:cs typeface="+mn-cs"/>
-                      </a:endParaRPr>
                     </a:p>
                   </a:txBody>
                   <a:tcPr marL="6350" marR="6350" marT="6350" marB="0" anchor="ctr">
@@ -21604,13 +21622,16 @@
                       <a:pPr algn="ctr" fontAlgn="b">
                         <a:buNone/>
                       </a:pPr>
-                      <a:endParaRPr lang="es-EC" sz="1200" b="0" i="0" u="none" strike="noStrike" dirty="0">
-                        <a:solidFill>
-                          <a:srgbClr val="000000"/>
-                        </a:solidFill>
-                        <a:effectLst/>
-                        <a:latin typeface="Century Gothic" panose="020B0502020202020204" pitchFamily="34" charset="0"/>
-                      </a:endParaRPr>
+                      <a:r>
+                        <a:rPr lang="es-EC" sz="1200" b="0" i="0" u="none" strike="noStrike" dirty="0">
+                          <a:solidFill>
+                            <a:srgbClr val="000000"/>
+                          </a:solidFill>
+                          <a:effectLst/>
+                          <a:latin typeface="Century Gothic" panose="020B0502020202020204" pitchFamily="34" charset="0"/>
+                        </a:rPr>
+                        <a:t>Gestión empresarial</a:t>
+                      </a:r>
                     </a:p>
                   </a:txBody>
                   <a:tcPr marL="6350" marR="6350" marT="6350" marB="0" anchor="ctr">
@@ -21668,54 +21689,19 @@
                     <a:bodyPr/>
                     <a:lstStyle/>
                     <a:p>
-                      <a:pPr marL="0" marR="0" lvl="0" indent="0" algn="ctr" defTabSz="914400" rtl="0" eaLnBrk="1" fontAlgn="b" latinLnBrk="0" hangingPunct="1">
-                        <a:lnSpc>
-                          <a:spcPct val="100000"/>
-                        </a:lnSpc>
-                        <a:spcBef>
-                          <a:spcPts val="0"/>
-                        </a:spcBef>
-                        <a:spcAft>
-                          <a:spcPts val="0"/>
-                        </a:spcAft>
-                        <a:buClrTx/>
-                        <a:buSzTx/>
-                        <a:buFontTx/>
+                      <a:pPr algn="ctr" fontAlgn="b">
                         <a:buNone/>
-                        <a:tabLst/>
-                        <a:defRPr/>
                       </a:pPr>
                       <a:r>
-                        <a:rPr kumimoji="0" lang="es-EC" sz="1200" b="0" i="0" u="none" strike="noStrike" kern="1200" cap="none" spc="0" normalizeH="0" baseline="0" noProof="0">
-                          <a:ln>
-                            <a:noFill/>
-                          </a:ln>
+                        <a:rPr lang="es-EC" sz="1200" b="0" i="0" u="none" strike="noStrike" dirty="0">
                           <a:solidFill>
                             <a:srgbClr val="000000"/>
                           </a:solidFill>
                           <a:effectLst/>
-                          <a:uLnTx/>
-                          <a:uFillTx/>
                           <a:latin typeface="Century Gothic" panose="020B0502020202020204" pitchFamily="34" charset="0"/>
-                          <a:ea typeface="+mn-ea"/>
-                          <a:cs typeface="+mn-cs"/>
                         </a:rPr>
-                        <a:t>%</a:t>
+                        <a:t>8%</a:t>
                       </a:r>
-                      <a:endParaRPr kumimoji="0" lang="es-EC" sz="1200" b="0" i="0" u="none" strike="noStrike" kern="1200" cap="none" spc="0" normalizeH="0" baseline="0" noProof="0" dirty="0">
-                        <a:ln>
-                          <a:noFill/>
-                        </a:ln>
-                        <a:solidFill>
-                          <a:srgbClr val="000000"/>
-                        </a:solidFill>
-                        <a:effectLst/>
-                        <a:uLnTx/>
-                        <a:uFillTx/>
-                        <a:latin typeface="Century Gothic" panose="020B0502020202020204" pitchFamily="34" charset="0"/>
-                        <a:ea typeface="+mn-ea"/>
-                        <a:cs typeface="+mn-cs"/>
-                      </a:endParaRPr>
                     </a:p>
                   </a:txBody>
                   <a:tcPr marL="6350" marR="6350" marT="6350" marB="0" anchor="ctr">
@@ -21783,13 +21769,16 @@
                       <a:pPr algn="ctr" fontAlgn="b">
                         <a:buNone/>
                       </a:pPr>
-                      <a:endParaRPr lang="es-EC" sz="1200" b="0" i="0" u="none" strike="noStrike">
-                        <a:solidFill>
-                          <a:srgbClr val="000000"/>
-                        </a:solidFill>
-                        <a:effectLst/>
-                        <a:latin typeface="Century Gothic" panose="020B0502020202020204" pitchFamily="34" charset="0"/>
-                      </a:endParaRPr>
+                      <a:r>
+                        <a:rPr lang="es-EC" sz="1200" b="0" i="0" u="none" strike="noStrike" dirty="0">
+                          <a:solidFill>
+                            <a:srgbClr val="000000"/>
+                          </a:solidFill>
+                          <a:effectLst/>
+                          <a:latin typeface="Century Gothic" panose="020B0502020202020204" pitchFamily="34" charset="0"/>
+                        </a:rPr>
+                        <a:t>Gestión empresarial</a:t>
+                      </a:r>
                     </a:p>
                   </a:txBody>
                   <a:tcPr marL="6350" marR="6350" marT="6350" marB="0" anchor="ctr">
@@ -21847,54 +21836,19 @@
                     <a:bodyPr/>
                     <a:lstStyle/>
                     <a:p>
-                      <a:pPr marL="0" marR="0" lvl="0" indent="0" algn="ctr" defTabSz="914400" rtl="0" eaLnBrk="1" fontAlgn="b" latinLnBrk="0" hangingPunct="1">
-                        <a:lnSpc>
-                          <a:spcPct val="100000"/>
-                        </a:lnSpc>
-                        <a:spcBef>
-                          <a:spcPts val="0"/>
-                        </a:spcBef>
-                        <a:spcAft>
-                          <a:spcPts val="0"/>
-                        </a:spcAft>
-                        <a:buClrTx/>
-                        <a:buSzTx/>
-                        <a:buFontTx/>
+                      <a:pPr algn="ctr" fontAlgn="b">
                         <a:buNone/>
-                        <a:tabLst/>
-                        <a:defRPr/>
                       </a:pPr>
                       <a:r>
-                        <a:rPr kumimoji="0" lang="es-EC" sz="1200" b="0" i="0" u="none" strike="noStrike" kern="1200" cap="none" spc="0" normalizeH="0" baseline="0" noProof="0">
-                          <a:ln>
-                            <a:noFill/>
-                          </a:ln>
+                        <a:rPr lang="es-EC" sz="1200" b="0" i="0" u="none" strike="noStrike" dirty="0">
                           <a:solidFill>
                             <a:srgbClr val="000000"/>
                           </a:solidFill>
                           <a:effectLst/>
-                          <a:uLnTx/>
-                          <a:uFillTx/>
                           <a:latin typeface="Century Gothic" panose="020B0502020202020204" pitchFamily="34" charset="0"/>
-                          <a:ea typeface="+mn-ea"/>
-                          <a:cs typeface="+mn-cs"/>
                         </a:rPr>
-                        <a:t>%</a:t>
+                        <a:t>8%</a:t>
                       </a:r>
-                      <a:endParaRPr kumimoji="0" lang="es-EC" sz="1200" b="0" i="0" u="none" strike="noStrike" kern="1200" cap="none" spc="0" normalizeH="0" baseline="0" noProof="0" dirty="0">
-                        <a:ln>
-                          <a:noFill/>
-                        </a:ln>
-                        <a:solidFill>
-                          <a:srgbClr val="000000"/>
-                        </a:solidFill>
-                        <a:effectLst/>
-                        <a:uLnTx/>
-                        <a:uFillTx/>
-                        <a:latin typeface="Century Gothic" panose="020B0502020202020204" pitchFamily="34" charset="0"/>
-                        <a:ea typeface="+mn-ea"/>
-                        <a:cs typeface="+mn-cs"/>
-                      </a:endParaRPr>
                     </a:p>
                   </a:txBody>
                   <a:tcPr marL="6350" marR="6350" marT="6350" marB="0" anchor="ctr">
@@ -22020,13 +21974,16 @@
                       <a:pPr algn="ctr" fontAlgn="b">
                         <a:buNone/>
                       </a:pPr>
-                      <a:endParaRPr lang="es-EC" sz="1200" b="0" i="0" u="none" strike="noStrike" dirty="0">
-                        <a:solidFill>
-                          <a:srgbClr val="000000"/>
-                        </a:solidFill>
-                        <a:effectLst/>
-                        <a:latin typeface="Century Gothic" panose="020B0502020202020204" pitchFamily="34" charset="0"/>
-                      </a:endParaRPr>
+                      <a:r>
+                        <a:rPr lang="es-EC" sz="1200" b="0" i="0" u="none" strike="noStrike" dirty="0">
+                          <a:solidFill>
+                            <a:srgbClr val="000000"/>
+                          </a:solidFill>
+                          <a:effectLst/>
+                          <a:latin typeface="Century Gothic" panose="020B0502020202020204" pitchFamily="34" charset="0"/>
+                        </a:rPr>
+                        <a:t>Gestión empresarial</a:t>
+                      </a:r>
                     </a:p>
                   </a:txBody>
                   <a:tcPr marL="6350" marR="6350" marT="6350" marB="0" anchor="ctr">
@@ -22084,54 +22041,19 @@
                     <a:bodyPr/>
                     <a:lstStyle/>
                     <a:p>
-                      <a:pPr marL="0" marR="0" lvl="0" indent="0" algn="ctr" defTabSz="914400" rtl="0" eaLnBrk="1" fontAlgn="b" latinLnBrk="0" hangingPunct="1">
-                        <a:lnSpc>
-                          <a:spcPct val="100000"/>
-                        </a:lnSpc>
-                        <a:spcBef>
-                          <a:spcPts val="0"/>
-                        </a:spcBef>
-                        <a:spcAft>
-                          <a:spcPts val="0"/>
-                        </a:spcAft>
-                        <a:buClrTx/>
-                        <a:buSzTx/>
-                        <a:buFontTx/>
+                      <a:pPr algn="ctr" fontAlgn="b">
                         <a:buNone/>
-                        <a:tabLst/>
-                        <a:defRPr/>
                       </a:pPr>
                       <a:r>
-                        <a:rPr kumimoji="0" lang="es-EC" sz="1200" b="0" i="0" u="none" strike="noStrike" kern="1200" cap="none" spc="0" normalizeH="0" baseline="0" noProof="0">
-                          <a:ln>
-                            <a:noFill/>
-                          </a:ln>
+                        <a:rPr lang="es-EC" sz="1200" b="0" i="0" u="none" strike="noStrike" dirty="0">
                           <a:solidFill>
                             <a:srgbClr val="000000"/>
                           </a:solidFill>
                           <a:effectLst/>
-                          <a:uLnTx/>
-                          <a:uFillTx/>
                           <a:latin typeface="Century Gothic" panose="020B0502020202020204" pitchFamily="34" charset="0"/>
-                          <a:ea typeface="+mn-ea"/>
-                          <a:cs typeface="+mn-cs"/>
                         </a:rPr>
-                        <a:t>%</a:t>
+                        <a:t>8%</a:t>
                       </a:r>
-                      <a:endParaRPr kumimoji="0" lang="es-EC" sz="1200" b="0" i="0" u="none" strike="noStrike" kern="1200" cap="none" spc="0" normalizeH="0" baseline="0" noProof="0" dirty="0">
-                        <a:ln>
-                          <a:noFill/>
-                        </a:ln>
-                        <a:solidFill>
-                          <a:srgbClr val="000000"/>
-                        </a:solidFill>
-                        <a:effectLst/>
-                        <a:uLnTx/>
-                        <a:uFillTx/>
-                        <a:latin typeface="Century Gothic" panose="020B0502020202020204" pitchFamily="34" charset="0"/>
-                        <a:ea typeface="+mn-ea"/>
-                        <a:cs typeface="+mn-cs"/>
-                      </a:endParaRPr>
                     </a:p>
                   </a:txBody>
                   <a:tcPr marL="6350" marR="6350" marT="6350" marB="0" anchor="ctr">
@@ -22199,13 +22121,16 @@
                       <a:pPr algn="ctr" fontAlgn="b">
                         <a:buNone/>
                       </a:pPr>
-                      <a:endParaRPr lang="es-MX" sz="1200" b="0" i="0" u="none" strike="noStrike">
-                        <a:solidFill>
-                          <a:srgbClr val="000000"/>
-                        </a:solidFill>
-                        <a:effectLst/>
-                        <a:latin typeface="Century Gothic" panose="020B0502020202020204" pitchFamily="34" charset="0"/>
-                      </a:endParaRPr>
+                      <a:r>
+                        <a:rPr lang="es-EC" sz="1200" b="0" i="0" u="none" strike="noStrike" dirty="0">
+                          <a:solidFill>
+                            <a:srgbClr val="000000"/>
+                          </a:solidFill>
+                          <a:effectLst/>
+                          <a:latin typeface="Century Gothic" panose="020B0502020202020204" pitchFamily="34" charset="0"/>
+                        </a:rPr>
+                        <a:t>Gestión empresarial</a:t>
+                      </a:r>
                     </a:p>
                   </a:txBody>
                   <a:tcPr marL="6350" marR="6350" marT="6350" marB="0" anchor="ctr">
@@ -22263,54 +22188,19 @@
                     <a:bodyPr/>
                     <a:lstStyle/>
                     <a:p>
-                      <a:pPr marL="0" marR="0" lvl="0" indent="0" algn="ctr" defTabSz="914400" rtl="0" eaLnBrk="1" fontAlgn="b" latinLnBrk="0" hangingPunct="1">
-                        <a:lnSpc>
-                          <a:spcPct val="100000"/>
-                        </a:lnSpc>
-                        <a:spcBef>
-                          <a:spcPts val="0"/>
-                        </a:spcBef>
-                        <a:spcAft>
-                          <a:spcPts val="0"/>
-                        </a:spcAft>
-                        <a:buClrTx/>
-                        <a:buSzTx/>
-                        <a:buFontTx/>
+                      <a:pPr algn="ctr" fontAlgn="b">
                         <a:buNone/>
-                        <a:tabLst/>
-                        <a:defRPr/>
                       </a:pPr>
                       <a:r>
-                        <a:rPr kumimoji="0" lang="es-EC" sz="1200" b="0" i="0" u="none" strike="noStrike" kern="1200" cap="none" spc="0" normalizeH="0" baseline="0" noProof="0">
-                          <a:ln>
-                            <a:noFill/>
-                          </a:ln>
+                        <a:rPr lang="es-EC" sz="1200" b="0" i="0" u="none" strike="noStrike" dirty="0">
                           <a:solidFill>
                             <a:srgbClr val="000000"/>
                           </a:solidFill>
                           <a:effectLst/>
-                          <a:uLnTx/>
-                          <a:uFillTx/>
                           <a:latin typeface="Century Gothic" panose="020B0502020202020204" pitchFamily="34" charset="0"/>
-                          <a:ea typeface="+mn-ea"/>
-                          <a:cs typeface="+mn-cs"/>
                         </a:rPr>
-                        <a:t>%</a:t>
+                        <a:t>8%</a:t>
                       </a:r>
-                      <a:endParaRPr kumimoji="0" lang="es-EC" sz="1200" b="0" i="0" u="none" strike="noStrike" kern="1200" cap="none" spc="0" normalizeH="0" baseline="0" noProof="0" dirty="0">
-                        <a:ln>
-                          <a:noFill/>
-                        </a:ln>
-                        <a:solidFill>
-                          <a:srgbClr val="000000"/>
-                        </a:solidFill>
-                        <a:effectLst/>
-                        <a:uLnTx/>
-                        <a:uFillTx/>
-                        <a:latin typeface="Century Gothic" panose="020B0502020202020204" pitchFamily="34" charset="0"/>
-                        <a:ea typeface="+mn-ea"/>
-                        <a:cs typeface="+mn-cs"/>
-                      </a:endParaRPr>
                     </a:p>
                   </a:txBody>
                   <a:tcPr marL="6350" marR="6350" marT="6350" marB="0" anchor="ctr">
@@ -22436,13 +22326,16 @@
                       <a:pPr algn="ctr" fontAlgn="b">
                         <a:buNone/>
                       </a:pPr>
-                      <a:endParaRPr lang="es-EC" sz="1200" b="0" i="0" u="none" strike="noStrike" dirty="0">
-                        <a:solidFill>
-                          <a:srgbClr val="000000"/>
-                        </a:solidFill>
-                        <a:effectLst/>
-                        <a:latin typeface="Century Gothic" panose="020B0502020202020204" pitchFamily="34" charset="0"/>
-                      </a:endParaRPr>
+                      <a:r>
+                        <a:rPr lang="es-EC" sz="1200" b="0" i="0" u="none" strike="noStrike" dirty="0">
+                          <a:solidFill>
+                            <a:srgbClr val="000000"/>
+                          </a:solidFill>
+                          <a:effectLst/>
+                          <a:latin typeface="Century Gothic" panose="020B0502020202020204" pitchFamily="34" charset="0"/>
+                        </a:rPr>
+                        <a:t>Gestión empresarial</a:t>
+                      </a:r>
                     </a:p>
                   </a:txBody>
                   <a:tcPr marL="6350" marR="6350" marT="6350" marB="0" anchor="ctr">
@@ -22500,54 +22393,19 @@
                     <a:bodyPr/>
                     <a:lstStyle/>
                     <a:p>
-                      <a:pPr marL="0" marR="0" lvl="0" indent="0" algn="ctr" defTabSz="914400" rtl="0" eaLnBrk="1" fontAlgn="b" latinLnBrk="0" hangingPunct="1">
-                        <a:lnSpc>
-                          <a:spcPct val="100000"/>
-                        </a:lnSpc>
-                        <a:spcBef>
-                          <a:spcPts val="0"/>
-                        </a:spcBef>
-                        <a:spcAft>
-                          <a:spcPts val="0"/>
-                        </a:spcAft>
-                        <a:buClrTx/>
-                        <a:buSzTx/>
-                        <a:buFontTx/>
+                      <a:pPr algn="ctr" fontAlgn="b">
                         <a:buNone/>
-                        <a:tabLst/>
-                        <a:defRPr/>
                       </a:pPr>
                       <a:r>
-                        <a:rPr kumimoji="0" lang="es-EC" sz="1200" b="0" i="0" u="none" strike="noStrike" kern="1200" cap="none" spc="0" normalizeH="0" baseline="0" noProof="0">
-                          <a:ln>
-                            <a:noFill/>
-                          </a:ln>
+                        <a:rPr lang="es-EC" sz="1200" b="0" i="0" u="none" strike="noStrike" dirty="0">
                           <a:solidFill>
                             <a:srgbClr val="000000"/>
                           </a:solidFill>
                           <a:effectLst/>
-                          <a:uLnTx/>
-                          <a:uFillTx/>
                           <a:latin typeface="Century Gothic" panose="020B0502020202020204" pitchFamily="34" charset="0"/>
-                          <a:ea typeface="+mn-ea"/>
-                          <a:cs typeface="+mn-cs"/>
                         </a:rPr>
-                        <a:t>%</a:t>
+                        <a:t>8%</a:t>
                       </a:r>
-                      <a:endParaRPr kumimoji="0" lang="es-EC" sz="1200" b="0" i="0" u="none" strike="noStrike" kern="1200" cap="none" spc="0" normalizeH="0" baseline="0" noProof="0" dirty="0">
-                        <a:ln>
-                          <a:noFill/>
-                        </a:ln>
-                        <a:solidFill>
-                          <a:srgbClr val="000000"/>
-                        </a:solidFill>
-                        <a:effectLst/>
-                        <a:uLnTx/>
-                        <a:uFillTx/>
-                        <a:latin typeface="Century Gothic" panose="020B0502020202020204" pitchFamily="34" charset="0"/>
-                        <a:ea typeface="+mn-ea"/>
-                        <a:cs typeface="+mn-cs"/>
-                      </a:endParaRPr>
                     </a:p>
                   </a:txBody>
                   <a:tcPr marL="6350" marR="6350" marT="6350" marB="0" anchor="ctr">
@@ -22606,7 +22464,7 @@
                   </a:ext>
                 </a:extLst>
               </a:tr>
-              <a:tr h="312245">
+              <a:tr h="314638">
                 <a:tc>
                   <a:txBody>
                     <a:bodyPr/>
@@ -22615,13 +22473,16 @@
                       <a:pPr algn="ctr" fontAlgn="b">
                         <a:buNone/>
                       </a:pPr>
-                      <a:endParaRPr lang="es-MX" sz="1200" b="0" i="0" u="none" strike="noStrike">
-                        <a:solidFill>
-                          <a:srgbClr val="000000"/>
-                        </a:solidFill>
-                        <a:effectLst/>
-                        <a:latin typeface="Century Gothic" panose="020B0502020202020204" pitchFamily="34" charset="0"/>
-                      </a:endParaRPr>
+                      <a:r>
+                        <a:rPr lang="es-EC" sz="1200" b="0" i="0" u="none" strike="noStrike" dirty="0">
+                          <a:solidFill>
+                            <a:srgbClr val="000000"/>
+                          </a:solidFill>
+                          <a:effectLst/>
+                          <a:latin typeface="Century Gothic" panose="020B0502020202020204" pitchFamily="34" charset="0"/>
+                        </a:rPr>
+                        <a:t>Gestión empresarial</a:t>
+                      </a:r>
                     </a:p>
                   </a:txBody>
                   <a:tcPr marL="6350" marR="6350" marT="6350" marB="0" anchor="ctr">
@@ -22679,39 +22540,18 @@
                     <a:bodyPr/>
                     <a:lstStyle/>
                     <a:p>
-                      <a:pPr marL="0" marR="0" lvl="0" indent="0" algn="ctr" defTabSz="914400" rtl="0" eaLnBrk="1" fontAlgn="b" latinLnBrk="0" hangingPunct="1">
-                        <a:lnSpc>
-                          <a:spcPct val="100000"/>
-                        </a:lnSpc>
-                        <a:spcBef>
-                          <a:spcPts val="0"/>
-                        </a:spcBef>
-                        <a:spcAft>
-                          <a:spcPts val="0"/>
-                        </a:spcAft>
-                        <a:buClrTx/>
-                        <a:buSzTx/>
-                        <a:buFontTx/>
+                      <a:pPr algn="ctr" fontAlgn="b">
                         <a:buNone/>
-                        <a:tabLst/>
-                        <a:defRPr/>
                       </a:pPr>
                       <a:r>
-                        <a:rPr kumimoji="0" lang="es-EC" sz="1200" b="0" i="0" u="none" strike="noStrike" kern="1200" cap="none" spc="0" normalizeH="0" baseline="0" noProof="0" dirty="0">
-                          <a:ln>
-                            <a:noFill/>
-                          </a:ln>
+                        <a:rPr lang="es-EC" sz="1200" b="0" i="0" u="none" strike="noStrike" dirty="0">
                           <a:solidFill>
                             <a:srgbClr val="000000"/>
                           </a:solidFill>
                           <a:effectLst/>
-                          <a:uLnTx/>
-                          <a:uFillTx/>
                           <a:latin typeface="Century Gothic" panose="020B0502020202020204" pitchFamily="34" charset="0"/>
-                          <a:ea typeface="+mn-ea"/>
-                          <a:cs typeface="+mn-cs"/>
                         </a:rPr>
-                        <a:t>%</a:t>
+                        <a:t>8%</a:t>
                       </a:r>
                     </a:p>
                   </a:txBody>
@@ -22838,13 +22678,16 @@
                       <a:pPr algn="ctr" fontAlgn="b">
                         <a:buNone/>
                       </a:pPr>
-                      <a:endParaRPr lang="es-EC" sz="1200" b="0" i="0" u="none" strike="noStrike" dirty="0">
-                        <a:solidFill>
-                          <a:srgbClr val="000000"/>
-                        </a:solidFill>
-                        <a:effectLst/>
-                        <a:latin typeface="Century Gothic" panose="020B0502020202020204" pitchFamily="34" charset="0"/>
-                      </a:endParaRPr>
+                      <a:r>
+                        <a:rPr lang="es-EC" sz="1200" b="0" i="0" u="none" strike="noStrike" dirty="0">
+                          <a:solidFill>
+                            <a:srgbClr val="000000"/>
+                          </a:solidFill>
+                          <a:effectLst/>
+                          <a:latin typeface="Century Gothic" panose="020B0502020202020204" pitchFamily="34" charset="0"/>
+                        </a:rPr>
+                        <a:t>Gestión empresarial</a:t>
+                      </a:r>
                     </a:p>
                   </a:txBody>
                   <a:tcPr marL="6350" marR="6350" marT="6350" marB="0" anchor="ctr">
@@ -22902,39 +22745,18 @@
                     <a:bodyPr/>
                     <a:lstStyle/>
                     <a:p>
-                      <a:pPr marL="0" marR="0" lvl="0" indent="0" algn="ctr" defTabSz="914400" rtl="0" eaLnBrk="1" fontAlgn="b" latinLnBrk="0" hangingPunct="1">
-                        <a:lnSpc>
-                          <a:spcPct val="100000"/>
-                        </a:lnSpc>
-                        <a:spcBef>
-                          <a:spcPts val="0"/>
-                        </a:spcBef>
-                        <a:spcAft>
-                          <a:spcPts val="0"/>
-                        </a:spcAft>
-                        <a:buClrTx/>
-                        <a:buSzTx/>
-                        <a:buFontTx/>
+                      <a:pPr algn="ctr" fontAlgn="b">
                         <a:buNone/>
-                        <a:tabLst/>
-                        <a:defRPr/>
                       </a:pPr>
                       <a:r>
-                        <a:rPr kumimoji="0" lang="es-EC" sz="1200" b="0" i="0" u="none" strike="noStrike" kern="1200" cap="none" spc="0" normalizeH="0" baseline="0" noProof="0" dirty="0">
-                          <a:ln>
-                            <a:noFill/>
-                          </a:ln>
+                        <a:rPr lang="es-EC" sz="1200" b="0" i="0" u="none" strike="noStrike" dirty="0">
                           <a:solidFill>
                             <a:srgbClr val="000000"/>
                           </a:solidFill>
                           <a:effectLst/>
-                          <a:uLnTx/>
-                          <a:uFillTx/>
                           <a:latin typeface="Century Gothic" panose="020B0502020202020204" pitchFamily="34" charset="0"/>
-                          <a:ea typeface="+mn-ea"/>
-                          <a:cs typeface="+mn-cs"/>
                         </a:rPr>
-                        <a:t>%</a:t>
+                        <a:t>8%</a:t>
                       </a:r>
                     </a:p>
                   </a:txBody>
@@ -25592,20 +25414,20 @@
 </file>
 
 <file path=customXml/item1.xml><?xml version="1.0" encoding="utf-8"?>
-<p:properties xmlns:p="http://schemas.microsoft.com/office/2006/metadata/properties" xmlns:xsi="http://www.w3.org/2001/XMLSchema-instance" xmlns:pc="http://schemas.microsoft.com/office/infopath/2007/PartnerControls">
-  <documentManagement>
-    <_activity xmlns="2a3a48df-fd5a-482e-a9d8-c269fe9c14b6" xsi:nil="true"/>
-  </documentManagement>
-</p:properties>
-</file>
-
-<file path=customXml/item2.xml><?xml version="1.0" encoding="utf-8"?>
 <?mso-contentType ?>
 <FormTemplates xmlns="http://schemas.microsoft.com/sharepoint/v3/contenttype/forms">
   <Display>DocumentLibraryForm</Display>
   <Edit>DocumentLibraryForm</Edit>
   <New>DocumentLibraryForm</New>
 </FormTemplates>
+</file>
+
+<file path=customXml/item2.xml><?xml version="1.0" encoding="utf-8"?>
+<p:properties xmlns:p="http://schemas.microsoft.com/office/2006/metadata/properties" xmlns:xsi="http://www.w3.org/2001/XMLSchema-instance" xmlns:pc="http://schemas.microsoft.com/office/infopath/2007/PartnerControls">
+  <documentManagement>
+    <_activity xmlns="2a3a48df-fd5a-482e-a9d8-c269fe9c14b6" xsi:nil="true"/>
+  </documentManagement>
+</p:properties>
 </file>
 
 <file path=customXml/item3.xml><?xml version="1.0" encoding="utf-8"?>
@@ -25842,6 +25664,14 @@
 </file>
 
 <file path=customXml/itemProps1.xml><?xml version="1.0" encoding="utf-8"?>
+<ds:datastoreItem xmlns:ds="http://schemas.openxmlformats.org/officeDocument/2006/customXml" ds:itemID="{67692C38-CDF4-4052-A640-AB9401404604}">
+  <ds:schemaRefs>
+    <ds:schemaRef ds:uri="http://schemas.microsoft.com/sharepoint/v3/contenttype/forms"/>
+  </ds:schemaRefs>
+</ds:datastoreItem>
+</file>
+
+<file path=customXml/itemProps2.xml><?xml version="1.0" encoding="utf-8"?>
 <ds:datastoreItem xmlns:ds="http://schemas.openxmlformats.org/officeDocument/2006/customXml" ds:itemID="{F5600CF1-25B4-4222-B369-2ED59CA2296E}">
   <ds:schemaRefs>
     <ds:schemaRef ds:uri="http://purl.org/dc/dcmitype/"/>
@@ -25854,14 +25684,6 @@
     <ds:schemaRef ds:uri="http://schemas.openxmlformats.org/package/2006/metadata/core-properties"/>
     <ds:schemaRef ds:uri="http://schemas.microsoft.com/office/infopath/2007/PartnerControls"/>
     <ds:schemaRef ds:uri="http://www.w3.org/XML/1998/namespace"/>
-  </ds:schemaRefs>
-</ds:datastoreItem>
-</file>
-
-<file path=customXml/itemProps2.xml><?xml version="1.0" encoding="utf-8"?>
-<ds:datastoreItem xmlns:ds="http://schemas.openxmlformats.org/officeDocument/2006/customXml" ds:itemID="{67692C38-CDF4-4052-A640-AB9401404604}">
-  <ds:schemaRefs>
-    <ds:schemaRef ds:uri="http://schemas.microsoft.com/sharepoint/v3/contenttype/forms"/>
   </ds:schemaRefs>
 </ds:datastoreItem>
 </file>

</xml_diff>